<commit_message>
Completion of Initial Design Prototype
Finished the prototype design of the Handsy Application in PPT for showing to Adviser and Respondents
</commit_message>
<xml_diff>
--- a/Prototype Design.pptx
+++ b/Prototype Design.pptx
@@ -9,20 +9,25 @@
     <p:sldId id="258" r:id="rId3"/>
     <p:sldId id="259" r:id="rId4"/>
     <p:sldId id="260" r:id="rId5"/>
+    <p:sldId id="261" r:id="rId6"/>
+    <p:sldId id="262" r:id="rId7"/>
+    <p:sldId id="263" r:id="rId8"/>
+    <p:sldId id="264" r:id="rId9"/>
+    <p:sldId id="265" r:id="rId10"/>
   </p:sldIdLst>
   <p:sldSz cx="10290175" cy="18291175"/>
   <p:notesSz cx="6858000" cy="9144000"/>
   <p:embeddedFontLst>
     <p:embeddedFont>
       <p:font typeface="Calibri" pitchFamily="34" charset="0"/>
-      <p:regular r:id="rId6"/>
-      <p:bold r:id="rId7"/>
-      <p:italic r:id="rId8"/>
-      <p:boldItalic r:id="rId9"/>
+      <p:regular r:id="rId11"/>
+      <p:bold r:id="rId12"/>
+      <p:italic r:id="rId13"/>
+      <p:boldItalic r:id="rId14"/>
     </p:embeddedFont>
     <p:embeddedFont>
       <p:font typeface="Feather Bold" pitchFamily="82" charset="0"/>
-      <p:bold r:id="rId10"/>
+      <p:bold r:id="rId15"/>
     </p:embeddedFont>
   </p:embeddedFontLst>
   <p:defaultTextStyle>
@@ -137,6 +142,15 @@
         <p14:section name="Main Screen" id="{D3870DBF-0E14-4E3B-AA24-3C76CF6508D0}">
           <p14:sldIdLst>
             <p14:sldId id="260"/>
+          </p14:sldIdLst>
+        </p14:section>
+        <p14:section name="Lesson/Test Section" id="{0C43330D-71A0-4250-8DD7-5EC8323EA7D4}">
+          <p14:sldIdLst>
+            <p14:sldId id="261"/>
+            <p14:sldId id="262"/>
+            <p14:sldId id="263"/>
+            <p14:sldId id="264"/>
+            <p14:sldId id="265"/>
           </p14:sldIdLst>
         </p14:section>
       </p14:sectionLst>
@@ -3252,6 +3266,69 @@
           </p:spPr>
         </p:pic>
       </p:grpSp>
+      <p:sp>
+        <p:nvSpPr>
+          <p:cNvPr id="2" name="Donut 1"/>
+          <p:cNvSpPr/>
+          <p:nvPr/>
+        </p:nvSpPr>
+        <p:spPr>
+          <a:xfrm>
+            <a:off x="4687887" y="14089650"/>
+            <a:ext cx="744126" cy="744126"/>
+          </a:xfrm>
+          <a:prstGeom prst="donut">
+            <a:avLst>
+              <a:gd name="adj" fmla="val 18012"/>
+            </a:avLst>
+          </a:prstGeom>
+          <a:gradFill>
+            <a:gsLst>
+              <a:gs pos="0">
+                <a:srgbClr val="9FDF80"/>
+              </a:gs>
+              <a:gs pos="50000">
+                <a:srgbClr val="6FCF40"/>
+              </a:gs>
+              <a:gs pos="100000">
+                <a:srgbClr val="21A316"/>
+              </a:gs>
+            </a:gsLst>
+            <a:lin ang="5400000" scaled="0"/>
+          </a:gradFill>
+          <a:ln>
+            <a:noFill/>
+          </a:ln>
+        </p:spPr>
+        <p:style>
+          <a:lnRef idx="2">
+            <a:schemeClr val="accent1">
+              <a:shade val="50000"/>
+            </a:schemeClr>
+          </a:lnRef>
+          <a:fillRef idx="1">
+            <a:schemeClr val="accent1"/>
+          </a:fillRef>
+          <a:effectRef idx="0">
+            <a:schemeClr val="accent1"/>
+          </a:effectRef>
+          <a:fontRef idx="minor">
+            <a:schemeClr val="lt1"/>
+          </a:fontRef>
+        </p:style>
+        <p:txBody>
+          <a:bodyPr rtlCol="0" anchor="ctr"/>
+          <a:lstStyle/>
+          <a:p>
+            <a:pPr algn="ctr"/>
+            <a:endParaRPr lang="en-PH">
+              <a:solidFill>
+                <a:schemeClr val="tx1"/>
+              </a:solidFill>
+            </a:endParaRPr>
+          </a:p>
+        </p:txBody>
+      </p:sp>
     </p:spTree>
     <p:extLst>
       <p:ext uri="{BB962C8B-B14F-4D97-AF65-F5344CB8AC3E}">
@@ -3265,9 +3342,76 @@
   <p:timing>
     <p:tnLst>
       <p:par>
-        <p:cTn id="1" dur="indefinite" restart="never" nodeType="tmRoot"/>
+        <p:cTn id="1" dur="indefinite" restart="never" nodeType="tmRoot">
+          <p:childTnLst>
+            <p:seq concurrent="1" nextAc="seek">
+              <p:cTn id="2" dur="indefinite" nodeType="mainSeq">
+                <p:childTnLst>
+                  <p:par>
+                    <p:cTn id="3" fill="hold">
+                      <p:stCondLst>
+                        <p:cond delay="indefinite"/>
+                        <p:cond evt="onBegin" delay="0">
+                          <p:tn val="2"/>
+                        </p:cond>
+                      </p:stCondLst>
+                      <p:childTnLst>
+                        <p:par>
+                          <p:cTn id="4" fill="hold">
+                            <p:stCondLst>
+                              <p:cond delay="0"/>
+                            </p:stCondLst>
+                            <p:childTnLst>
+                              <p:par>
+                                <p:cTn id="5" presetID="8" presetClass="emph" presetSubtype="0" repeatCount="indefinite" fill="hold" grpId="0" nodeType="withEffect">
+                                  <p:stCondLst>
+                                    <p:cond delay="0"/>
+                                  </p:stCondLst>
+                                  <p:childTnLst>
+                                    <p:animRot by="21600000">
+                                      <p:cBhvr>
+                                        <p:cTn id="6" dur="500" fill="hold"/>
+                                        <p:tgtEl>
+                                          <p:spTgt spid="2"/>
+                                        </p:tgtEl>
+                                        <p:attrNameLst>
+                                          <p:attrName>r</p:attrName>
+                                        </p:attrNameLst>
+                                      </p:cBhvr>
+                                    </p:animRot>
+                                  </p:childTnLst>
+                                </p:cTn>
+                              </p:par>
+                            </p:childTnLst>
+                          </p:cTn>
+                        </p:par>
+                      </p:childTnLst>
+                    </p:cTn>
+                  </p:par>
+                </p:childTnLst>
+              </p:cTn>
+              <p:prevCondLst>
+                <p:cond evt="onPrev" delay="0">
+                  <p:tgtEl>
+                    <p:sldTgt/>
+                  </p:tgtEl>
+                </p:cond>
+              </p:prevCondLst>
+              <p:nextCondLst>
+                <p:cond evt="onNext" delay="0">
+                  <p:tgtEl>
+                    <p:sldTgt/>
+                  </p:tgtEl>
+                </p:cond>
+              </p:nextCondLst>
+            </p:seq>
+          </p:childTnLst>
+        </p:cTn>
       </p:par>
     </p:tnLst>
+    <p:bldLst>
+      <p:bldP spid="2" grpId="0" animBg="1"/>
+    </p:bldLst>
   </p:timing>
 </p:sld>
 </file>
@@ -3591,92 +3735,6 @@
           <a:chExt cx="0" cy="0"/>
         </a:xfrm>
       </p:grpSpPr>
-      <p:sp>
-        <p:nvSpPr>
-          <p:cNvPr id="4" name="Rectangle 3"/>
-          <p:cNvSpPr/>
-          <p:nvPr/>
-        </p:nvSpPr>
-        <p:spPr>
-          <a:xfrm>
-            <a:off x="0" y="0"/>
-            <a:ext cx="10290175" cy="1830387"/>
-          </a:xfrm>
-          <a:prstGeom prst="rect">
-            <a:avLst/>
-          </a:prstGeom>
-          <a:solidFill>
-            <a:srgbClr val="21A316"/>
-          </a:solidFill>
-          <a:ln>
-            <a:noFill/>
-          </a:ln>
-        </p:spPr>
-        <p:style>
-          <a:lnRef idx="2">
-            <a:schemeClr val="accent1">
-              <a:shade val="50000"/>
-            </a:schemeClr>
-          </a:lnRef>
-          <a:fillRef idx="1">
-            <a:schemeClr val="accent1"/>
-          </a:fillRef>
-          <a:effectRef idx="0">
-            <a:schemeClr val="accent1"/>
-          </a:effectRef>
-          <a:fontRef idx="minor">
-            <a:schemeClr val="lt1"/>
-          </a:fontRef>
-        </p:style>
-        <p:txBody>
-          <a:bodyPr rtlCol="0" anchor="ctr"/>
-          <a:lstStyle/>
-          <a:p>
-            <a:pPr algn="ctr"/>
-            <a:endParaRPr lang="en-PH"/>
-          </a:p>
-        </p:txBody>
-      </p:sp>
-      <p:sp>
-        <p:nvSpPr>
-          <p:cNvPr id="5" name="TextBox 4"/>
-          <p:cNvSpPr txBox="1"/>
-          <p:nvPr/>
-        </p:nvSpPr>
-        <p:spPr>
-          <a:xfrm>
-            <a:off x="649287" y="499694"/>
-            <a:ext cx="6781800" cy="830997"/>
-          </a:xfrm>
-          <a:prstGeom prst="rect">
-            <a:avLst/>
-          </a:prstGeom>
-          <a:noFill/>
-        </p:spPr>
-        <p:txBody>
-          <a:bodyPr wrap="square" rtlCol="0">
-            <a:spAutoFit/>
-          </a:bodyPr>
-          <a:lstStyle/>
-          <a:p>
-            <a:r>
-              <a:rPr lang="en-PH" sz="4800" dirty="0" smtClean="0">
-                <a:solidFill>
-                  <a:schemeClr val="bg1"/>
-                </a:solidFill>
-                <a:latin typeface="Feather Bold" pitchFamily="82" charset="0"/>
-              </a:rPr>
-              <a:t>HANDSY</a:t>
-            </a:r>
-            <a:endParaRPr lang="en-PH" sz="4800" dirty="0">
-              <a:solidFill>
-                <a:schemeClr val="bg1"/>
-              </a:solidFill>
-              <a:latin typeface="Feather Bold" pitchFamily="82" charset="0"/>
-            </a:endParaRPr>
-          </a:p>
-        </p:txBody>
-      </p:sp>
       <p:grpSp>
         <p:nvGrpSpPr>
           <p:cNvPr id="2" name="Group 1"/>
@@ -3822,7 +3880,7 @@
         </p:blipFill>
         <p:spPr bwMode="auto">
           <a:xfrm>
-            <a:off x="421085" y="1297783"/>
+            <a:off x="421085" y="763587"/>
             <a:ext cx="9448004" cy="9448004"/>
           </a:xfrm>
           <a:prstGeom prst="rect">
@@ -3840,6 +3898,146 @@
           </a:extLst>
         </p:spPr>
       </p:pic>
+      <p:grpSp>
+        <p:nvGrpSpPr>
+          <p:cNvPr id="8" name="Group 7"/>
+          <p:cNvGrpSpPr/>
+          <p:nvPr/>
+        </p:nvGrpSpPr>
+        <p:grpSpPr>
+          <a:xfrm>
+            <a:off x="-36515" y="0"/>
+            <a:ext cx="10326690" cy="915987"/>
+            <a:chOff x="-36515" y="0"/>
+            <a:chExt cx="10326690" cy="915987"/>
+          </a:xfrm>
+        </p:grpSpPr>
+        <p:sp>
+          <p:nvSpPr>
+            <p:cNvPr id="4" name="Rectangle 3"/>
+            <p:cNvSpPr/>
+            <p:nvPr/>
+          </p:nvSpPr>
+          <p:spPr>
+            <a:xfrm>
+              <a:off x="-36515" y="0"/>
+              <a:ext cx="10326690" cy="915987"/>
+            </a:xfrm>
+            <a:prstGeom prst="rect">
+              <a:avLst/>
+            </a:prstGeom>
+            <a:solidFill>
+              <a:srgbClr val="21A316"/>
+            </a:solidFill>
+            <a:ln>
+              <a:noFill/>
+            </a:ln>
+          </p:spPr>
+          <p:style>
+            <a:lnRef idx="2">
+              <a:schemeClr val="accent1">
+                <a:shade val="50000"/>
+              </a:schemeClr>
+            </a:lnRef>
+            <a:fillRef idx="1">
+              <a:schemeClr val="accent1"/>
+            </a:fillRef>
+            <a:effectRef idx="0">
+              <a:schemeClr val="accent1"/>
+            </a:effectRef>
+            <a:fontRef idx="minor">
+              <a:schemeClr val="lt1"/>
+            </a:fontRef>
+          </p:style>
+          <p:txBody>
+            <a:bodyPr rtlCol="0" anchor="ctr"/>
+            <a:lstStyle/>
+            <a:p>
+              <a:pPr algn="ctr"/>
+              <a:endParaRPr lang="en-PH"/>
+            </a:p>
+          </p:txBody>
+        </p:sp>
+        <p:sp>
+          <p:nvSpPr>
+            <p:cNvPr id="5" name="TextBox 4"/>
+            <p:cNvSpPr txBox="1"/>
+            <p:nvPr/>
+          </p:nvSpPr>
+          <p:spPr>
+            <a:xfrm>
+              <a:off x="1258887" y="153987"/>
+              <a:ext cx="6781800" cy="646331"/>
+            </a:xfrm>
+            <a:prstGeom prst="rect">
+              <a:avLst/>
+            </a:prstGeom>
+            <a:noFill/>
+          </p:spPr>
+          <p:txBody>
+            <a:bodyPr wrap="square" rtlCol="0">
+              <a:spAutoFit/>
+            </a:bodyPr>
+            <a:lstStyle/>
+            <a:p>
+              <a:r>
+                <a:rPr lang="en-PH" sz="3600" dirty="0" smtClean="0">
+                  <a:solidFill>
+                    <a:schemeClr val="bg1"/>
+                  </a:solidFill>
+                  <a:latin typeface="Feather Bold" pitchFamily="82" charset="0"/>
+                </a:rPr>
+                <a:t>HANDSY</a:t>
+              </a:r>
+              <a:endParaRPr lang="en-PH" sz="3600" dirty="0">
+                <a:solidFill>
+                  <a:schemeClr val="bg1"/>
+                </a:solidFill>
+                <a:latin typeface="Feather Bold" pitchFamily="82" charset="0"/>
+              </a:endParaRPr>
+            </a:p>
+          </p:txBody>
+        </p:sp>
+        <p:pic>
+          <p:nvPicPr>
+            <p:cNvPr id="9" name="Picture 2" descr="F:\Installers\Miscellaneous Resources\mascot_official.png"/>
+            <p:cNvPicPr>
+              <a:picLocks noChangeAspect="1" noChangeArrowheads="1"/>
+            </p:cNvPicPr>
+            <p:nvPr/>
+          </p:nvPicPr>
+          <p:blipFill rotWithShape="1">
+            <a:blip r:embed="rId3" cstate="print">
+              <a:extLst>
+                <a:ext uri="{28A0092B-C50C-407E-A947-70E740481C1C}">
+                  <a14:useLocalDpi xmlns:a14="http://schemas.microsoft.com/office/drawing/2010/main" val="0"/>
+                </a:ext>
+              </a:extLst>
+            </a:blip>
+            <a:srcRect l="16482" t="11469" r="15709" b="15037"/>
+            <a:stretch/>
+          </p:blipFill>
+          <p:spPr bwMode="auto">
+            <a:xfrm>
+              <a:off x="456858" y="46717"/>
+              <a:ext cx="802029" cy="869270"/>
+            </a:xfrm>
+            <a:prstGeom prst="rect">
+              <a:avLst/>
+            </a:prstGeom>
+            <a:noFill/>
+            <a:extLst>
+              <a:ext uri="{909E8E84-426E-40DD-AFC4-6F175D3DCCD1}">
+                <a14:hiddenFill xmlns:a14="http://schemas.microsoft.com/office/drawing/2010/main">
+                  <a:solidFill>
+                    <a:srgbClr val="FFFFFF"/>
+                  </a:solidFill>
+                </a14:hiddenFill>
+              </a:ext>
+            </a:extLst>
+          </p:spPr>
+        </p:pic>
+      </p:grpSp>
     </p:spTree>
     <p:extLst>
       <p:ext uri="{BB962C8B-B14F-4D97-AF65-F5344CB8AC3E}">
@@ -3877,16 +4075,156 @@
           <a:chExt cx="0" cy="0"/>
         </a:xfrm>
       </p:grpSpPr>
-      <p:sp>
-        <p:nvSpPr>
-          <p:cNvPr id="4" name="Rectangle 3"/>
+      <p:grpSp>
+        <p:nvGrpSpPr>
+          <p:cNvPr id="8" name="Group 7"/>
+          <p:cNvGrpSpPr/>
+          <p:nvPr/>
+        </p:nvGrpSpPr>
+        <p:grpSpPr>
+          <a:xfrm>
+            <a:off x="-36515" y="0"/>
+            <a:ext cx="10326690" cy="915987"/>
+            <a:chOff x="-36515" y="0"/>
+            <a:chExt cx="10326690" cy="915987"/>
+          </a:xfrm>
+        </p:grpSpPr>
+        <p:sp>
+          <p:nvSpPr>
+            <p:cNvPr id="9" name="Rectangle 8"/>
+            <p:cNvSpPr/>
+            <p:nvPr/>
+          </p:nvSpPr>
+          <p:spPr>
+            <a:xfrm>
+              <a:off x="-36515" y="0"/>
+              <a:ext cx="10326690" cy="915987"/>
+            </a:xfrm>
+            <a:prstGeom prst="rect">
+              <a:avLst/>
+            </a:prstGeom>
+            <a:solidFill>
+              <a:srgbClr val="21A316"/>
+            </a:solidFill>
+            <a:ln>
+              <a:noFill/>
+            </a:ln>
+          </p:spPr>
+          <p:style>
+            <a:lnRef idx="2">
+              <a:schemeClr val="accent1">
+                <a:shade val="50000"/>
+              </a:schemeClr>
+            </a:lnRef>
+            <a:fillRef idx="1">
+              <a:schemeClr val="accent1"/>
+            </a:fillRef>
+            <a:effectRef idx="0">
+              <a:schemeClr val="accent1"/>
+            </a:effectRef>
+            <a:fontRef idx="minor">
+              <a:schemeClr val="lt1"/>
+            </a:fontRef>
+          </p:style>
+          <p:txBody>
+            <a:bodyPr rtlCol="0" anchor="ctr"/>
+            <a:lstStyle/>
+            <a:p>
+              <a:pPr algn="ctr"/>
+              <a:endParaRPr lang="en-PH"/>
+            </a:p>
+          </p:txBody>
+        </p:sp>
+        <p:sp>
+          <p:nvSpPr>
+            <p:cNvPr id="10" name="TextBox 9"/>
+            <p:cNvSpPr txBox="1"/>
+            <p:nvPr/>
+          </p:nvSpPr>
+          <p:spPr>
+            <a:xfrm>
+              <a:off x="1258887" y="153987"/>
+              <a:ext cx="6781800" cy="646331"/>
+            </a:xfrm>
+            <a:prstGeom prst="rect">
+              <a:avLst/>
+            </a:prstGeom>
+            <a:noFill/>
+          </p:spPr>
+          <p:txBody>
+            <a:bodyPr wrap="square" rtlCol="0">
+              <a:spAutoFit/>
+            </a:bodyPr>
+            <a:lstStyle/>
+            <a:p>
+              <a:r>
+                <a:rPr lang="en-PH" sz="3600" dirty="0" smtClean="0">
+                  <a:solidFill>
+                    <a:schemeClr val="bg1"/>
+                  </a:solidFill>
+                  <a:latin typeface="Feather Bold" pitchFamily="82" charset="0"/>
+                </a:rPr>
+                <a:t>HANDSY</a:t>
+              </a:r>
+              <a:endParaRPr lang="en-PH" sz="3600" dirty="0">
+                <a:solidFill>
+                  <a:schemeClr val="bg1"/>
+                </a:solidFill>
+                <a:latin typeface="Feather Bold" pitchFamily="82" charset="0"/>
+              </a:endParaRPr>
+            </a:p>
+          </p:txBody>
+        </p:sp>
+        <p:pic>
+          <p:nvPicPr>
+            <p:cNvPr id="11" name="Picture 2" descr="F:\Installers\Miscellaneous Resources\mascot_official.png"/>
+            <p:cNvPicPr>
+              <a:picLocks noChangeAspect="1" noChangeArrowheads="1"/>
+            </p:cNvPicPr>
+            <p:nvPr/>
+          </p:nvPicPr>
+          <p:blipFill rotWithShape="1">
+            <a:blip r:embed="rId2" cstate="print">
+              <a:extLst>
+                <a:ext uri="{28A0092B-C50C-407E-A947-70E740481C1C}">
+                  <a14:useLocalDpi xmlns:a14="http://schemas.microsoft.com/office/drawing/2010/main" val="0"/>
+                </a:ext>
+              </a:extLst>
+            </a:blip>
+            <a:srcRect l="16482" t="11469" r="15709" b="15037"/>
+            <a:stretch/>
+          </p:blipFill>
+          <p:spPr bwMode="auto">
+            <a:xfrm>
+              <a:off x="456858" y="46717"/>
+              <a:ext cx="802029" cy="869270"/>
+            </a:xfrm>
+            <a:prstGeom prst="rect">
+              <a:avLst/>
+            </a:prstGeom>
+            <a:noFill/>
+            <a:extLst>
+              <a:ext uri="{909E8E84-426E-40DD-AFC4-6F175D3DCCD1}">
+                <a14:hiddenFill xmlns:a14="http://schemas.microsoft.com/office/drawing/2010/main">
+                  <a:solidFill>
+                    <a:srgbClr val="FFFFFF"/>
+                  </a:solidFill>
+                </a14:hiddenFill>
+              </a:ext>
+            </a:extLst>
+          </p:spPr>
+        </p:pic>
+      </p:grpSp>
+      <p:sp>
+        <p:nvSpPr>
+          <p:cNvPr id="14" name="Rectangle 13"/>
           <p:cNvSpPr/>
           <p:nvPr/>
         </p:nvSpPr>
         <p:spPr>
           <a:xfrm>
-            <a:off x="0" y="0"/>
-            <a:ext cx="10290175" cy="1830387"/>
+            <a:off x="0" y="16917988"/>
+            <a:ext cx="10290175" cy="1366814"/>
           </a:xfrm>
           <a:prstGeom prst="rect">
             <a:avLst/>
@@ -3925,19 +4263,172 @@
       </p:sp>
       <p:sp>
         <p:nvSpPr>
-          <p:cNvPr id="5" name="TextBox 4"/>
+          <p:cNvPr id="17" name="TextBox 16"/>
           <p:cNvSpPr txBox="1"/>
           <p:nvPr/>
         </p:nvSpPr>
         <p:spPr>
           <a:xfrm>
-            <a:off x="649287" y="499694"/>
-            <a:ext cx="6781800" cy="830997"/>
+            <a:off x="915987" y="17231347"/>
+            <a:ext cx="3390900" cy="808851"/>
+          </a:xfrm>
+          <a:prstGeom prst="roundRect">
+            <a:avLst>
+              <a:gd name="adj" fmla="val 35131"/>
+            </a:avLst>
+          </a:prstGeom>
+          <a:solidFill>
+            <a:srgbClr val="6FCF40"/>
+          </a:solidFill>
+        </p:spPr>
+        <p:txBody>
+          <a:bodyPr wrap="square" rtlCol="0" anchor="ctr">
+            <a:spAutoFit/>
+          </a:bodyPr>
+          <a:lstStyle/>
+          <a:p>
+            <a:pPr algn="ctr"/>
+            <a:r>
+              <a:rPr lang="en-PH" sz="3600" dirty="0" smtClean="0">
+                <a:solidFill>
+                  <a:schemeClr val="bg1"/>
+                </a:solidFill>
+                <a:latin typeface="Feather Bold" pitchFamily="82" charset="0"/>
+              </a:rPr>
+              <a:t>LESSONS</a:t>
+            </a:r>
+            <a:endParaRPr lang="en-PH" sz="3600" dirty="0">
+              <a:solidFill>
+                <a:schemeClr val="bg1"/>
+              </a:solidFill>
+              <a:latin typeface="Feather Bold" pitchFamily="82" charset="0"/>
+            </a:endParaRPr>
+          </a:p>
+        </p:txBody>
+      </p:sp>
+      <p:sp>
+        <p:nvSpPr>
+          <p:cNvPr id="19" name="TextBox 18"/>
+          <p:cNvSpPr txBox="1"/>
+          <p:nvPr/>
+        </p:nvSpPr>
+        <p:spPr>
+          <a:xfrm>
+            <a:off x="5983287" y="17196968"/>
+            <a:ext cx="3390900" cy="808851"/>
+          </a:xfrm>
+          <a:prstGeom prst="roundRect">
+            <a:avLst>
+              <a:gd name="adj" fmla="val 35131"/>
+            </a:avLst>
+          </a:prstGeom>
+          <a:solidFill>
+            <a:srgbClr val="9FDF80"/>
+          </a:solidFill>
+        </p:spPr>
+        <p:txBody>
+          <a:bodyPr wrap="square" rtlCol="0" anchor="ctr">
+            <a:spAutoFit/>
+          </a:bodyPr>
+          <a:lstStyle/>
+          <a:p>
+            <a:pPr algn="ctr"/>
+            <a:r>
+              <a:rPr lang="en-PH" sz="3600" dirty="0" smtClean="0">
+                <a:solidFill>
+                  <a:schemeClr val="bg1"/>
+                </a:solidFill>
+                <a:latin typeface="Feather Bold" pitchFamily="82" charset="0"/>
+              </a:rPr>
+              <a:t>STATS</a:t>
+            </a:r>
+            <a:endParaRPr lang="en-PH" sz="3600" dirty="0">
+              <a:solidFill>
+                <a:schemeClr val="bg1"/>
+              </a:solidFill>
+              <a:latin typeface="Feather Bold" pitchFamily="82" charset="0"/>
+            </a:endParaRPr>
+          </a:p>
+        </p:txBody>
+      </p:sp>
+      <p:sp>
+        <p:nvSpPr>
+          <p:cNvPr id="32" name="Rounded Rectangle 31"/>
+          <p:cNvSpPr/>
+          <p:nvPr/>
+        </p:nvSpPr>
+        <p:spPr>
+          <a:xfrm>
+            <a:off x="206063" y="1640292"/>
+            <a:ext cx="9878048" cy="3351989"/>
+          </a:xfrm>
+          <a:prstGeom prst="roundRect">
+            <a:avLst>
+              <a:gd name="adj" fmla="val 9952"/>
+            </a:avLst>
+          </a:prstGeom>
+          <a:blipFill dpi="0" rotWithShape="1">
+            <a:blip r:embed="rId3">
+              <a:extLst>
+                <a:ext uri="{28A0092B-C50C-407E-A947-70E740481C1C}">
+                  <a14:useLocalDpi xmlns:a14="http://schemas.microsoft.com/office/drawing/2010/main" val="0"/>
+                </a:ext>
+              </a:extLst>
+            </a:blip>
+            <a:srcRect/>
+            <a:stretch>
+              <a:fillRect/>
+            </a:stretch>
+          </a:blipFill>
+          <a:ln>
+            <a:solidFill>
+              <a:srgbClr val="6FCF40"/>
+            </a:solidFill>
+          </a:ln>
+        </p:spPr>
+        <p:style>
+          <a:lnRef idx="2">
+            <a:schemeClr val="accent1">
+              <a:shade val="50000"/>
+            </a:schemeClr>
+          </a:lnRef>
+          <a:fillRef idx="1">
+            <a:schemeClr val="accent1"/>
+          </a:fillRef>
+          <a:effectRef idx="0">
+            <a:schemeClr val="accent1"/>
+          </a:effectRef>
+          <a:fontRef idx="minor">
+            <a:schemeClr val="lt1"/>
+          </a:fontRef>
+        </p:style>
+        <p:txBody>
+          <a:bodyPr rtlCol="0" anchor="ctr"/>
+          <a:lstStyle/>
+          <a:p>
+            <a:pPr algn="ctr"/>
+            <a:endParaRPr lang="en-PH"/>
+          </a:p>
+        </p:txBody>
+      </p:sp>
+      <p:sp>
+        <p:nvSpPr>
+          <p:cNvPr id="36" name="TextBox 35"/>
+          <p:cNvSpPr txBox="1"/>
+          <p:nvPr/>
+        </p:nvSpPr>
+        <p:spPr>
+          <a:xfrm>
+            <a:off x="344487" y="1793656"/>
+            <a:ext cx="6781800" cy="646331"/>
           </a:xfrm>
           <a:prstGeom prst="rect">
             <a:avLst/>
           </a:prstGeom>
           <a:noFill/>
+          <a:ln>
+            <a:noFill/>
+          </a:ln>
         </p:spPr>
         <p:txBody>
           <a:bodyPr wrap="square" rtlCol="0">
@@ -3946,15 +4437,25 @@
           <a:lstStyle/>
           <a:p>
             <a:r>
-              <a:rPr lang="en-PH" sz="4800" dirty="0" smtClean="0">
+              <a:rPr lang="en-PH" sz="3600" dirty="0" smtClean="0">
+                <a:ln w="3175">
+                  <a:solidFill>
+                    <a:srgbClr val="9FDF80"/>
+                  </a:solidFill>
+                </a:ln>
                 <a:solidFill>
                   <a:schemeClr val="bg1"/>
                 </a:solidFill>
                 <a:latin typeface="Feather Bold" pitchFamily="82" charset="0"/>
               </a:rPr>
-              <a:t>HANDSY</a:t>
-            </a:r>
-            <a:endParaRPr lang="en-PH" sz="4800" dirty="0">
+              <a:t>Lesson 1</a:t>
+            </a:r>
+            <a:endParaRPr lang="en-PH" sz="3600" dirty="0">
+              <a:ln w="3175">
+                <a:solidFill>
+                  <a:srgbClr val="9FDF80"/>
+                </a:solidFill>
+              </a:ln>
               <a:solidFill>
                 <a:schemeClr val="bg1"/>
               </a:solidFill>
@@ -3963,6 +4464,2660 @@
           </a:p>
         </p:txBody>
       </p:sp>
+      <p:sp>
+        <p:nvSpPr>
+          <p:cNvPr id="39" name="Rounded Rectangle 38"/>
+          <p:cNvSpPr/>
+          <p:nvPr/>
+        </p:nvSpPr>
+        <p:spPr>
+          <a:xfrm>
+            <a:off x="206064" y="5526491"/>
+            <a:ext cx="9878048" cy="3351989"/>
+          </a:xfrm>
+          <a:prstGeom prst="roundRect">
+            <a:avLst>
+              <a:gd name="adj" fmla="val 9952"/>
+            </a:avLst>
+          </a:prstGeom>
+          <a:blipFill dpi="0" rotWithShape="1">
+            <a:blip r:embed="rId4">
+              <a:extLst>
+                <a:ext uri="{28A0092B-C50C-407E-A947-70E740481C1C}">
+                  <a14:useLocalDpi xmlns:a14="http://schemas.microsoft.com/office/drawing/2010/main" val="0"/>
+                </a:ext>
+              </a:extLst>
+            </a:blip>
+            <a:srcRect/>
+            <a:stretch>
+              <a:fillRect/>
+            </a:stretch>
+          </a:blipFill>
+          <a:ln>
+            <a:solidFill>
+              <a:srgbClr val="6FCF40"/>
+            </a:solidFill>
+          </a:ln>
+        </p:spPr>
+        <p:style>
+          <a:lnRef idx="2">
+            <a:schemeClr val="accent1">
+              <a:shade val="50000"/>
+            </a:schemeClr>
+          </a:lnRef>
+          <a:fillRef idx="1">
+            <a:schemeClr val="accent1"/>
+          </a:fillRef>
+          <a:effectRef idx="0">
+            <a:schemeClr val="accent1"/>
+          </a:effectRef>
+          <a:fontRef idx="minor">
+            <a:schemeClr val="lt1"/>
+          </a:fontRef>
+        </p:style>
+        <p:txBody>
+          <a:bodyPr rtlCol="0" anchor="ctr"/>
+          <a:lstStyle/>
+          <a:p>
+            <a:pPr algn="ctr"/>
+            <a:endParaRPr lang="en-PH"/>
+          </a:p>
+        </p:txBody>
+      </p:sp>
+      <p:sp>
+        <p:nvSpPr>
+          <p:cNvPr id="40" name="TextBox 39"/>
+          <p:cNvSpPr txBox="1"/>
+          <p:nvPr/>
+        </p:nvSpPr>
+        <p:spPr>
+          <a:xfrm>
+            <a:off x="344488" y="5679855"/>
+            <a:ext cx="6781800" cy="646331"/>
+          </a:xfrm>
+          <a:prstGeom prst="rect">
+            <a:avLst/>
+          </a:prstGeom>
+          <a:noFill/>
+          <a:ln>
+            <a:noFill/>
+          </a:ln>
+        </p:spPr>
+        <p:txBody>
+          <a:bodyPr wrap="square" rtlCol="0">
+            <a:spAutoFit/>
+          </a:bodyPr>
+          <a:lstStyle/>
+          <a:p>
+            <a:r>
+              <a:rPr lang="en-PH" sz="3600" dirty="0" smtClean="0">
+                <a:ln w="3175">
+                  <a:solidFill>
+                    <a:srgbClr val="9FDF80"/>
+                  </a:solidFill>
+                </a:ln>
+                <a:solidFill>
+                  <a:schemeClr val="bg1"/>
+                </a:solidFill>
+                <a:latin typeface="Feather Bold" pitchFamily="82" charset="0"/>
+              </a:rPr>
+              <a:t>Lesson 2</a:t>
+            </a:r>
+            <a:endParaRPr lang="en-PH" sz="3600" dirty="0">
+              <a:ln w="3175">
+                <a:solidFill>
+                  <a:srgbClr val="9FDF80"/>
+                </a:solidFill>
+              </a:ln>
+              <a:solidFill>
+                <a:schemeClr val="bg1"/>
+              </a:solidFill>
+              <a:latin typeface="Feather Bold" pitchFamily="82" charset="0"/>
+            </a:endParaRPr>
+          </a:p>
+        </p:txBody>
+      </p:sp>
+      <p:sp>
+        <p:nvSpPr>
+          <p:cNvPr id="42" name="Rounded Rectangle 41"/>
+          <p:cNvSpPr/>
+          <p:nvPr/>
+        </p:nvSpPr>
+        <p:spPr>
+          <a:xfrm>
+            <a:off x="206064" y="9414279"/>
+            <a:ext cx="9878048" cy="3351989"/>
+          </a:xfrm>
+          <a:prstGeom prst="roundRect">
+            <a:avLst>
+              <a:gd name="adj" fmla="val 9952"/>
+            </a:avLst>
+          </a:prstGeom>
+          <a:blipFill dpi="0" rotWithShape="1">
+            <a:blip r:embed="rId5">
+              <a:extLst>
+                <a:ext uri="{28A0092B-C50C-407E-A947-70E740481C1C}">
+                  <a14:useLocalDpi xmlns:a14="http://schemas.microsoft.com/office/drawing/2010/main" val="0"/>
+                </a:ext>
+              </a:extLst>
+            </a:blip>
+            <a:srcRect/>
+            <a:stretch>
+              <a:fillRect/>
+            </a:stretch>
+          </a:blipFill>
+          <a:ln>
+            <a:solidFill>
+              <a:srgbClr val="6FCF40"/>
+            </a:solidFill>
+          </a:ln>
+        </p:spPr>
+        <p:style>
+          <a:lnRef idx="2">
+            <a:schemeClr val="accent1">
+              <a:shade val="50000"/>
+            </a:schemeClr>
+          </a:lnRef>
+          <a:fillRef idx="1">
+            <a:schemeClr val="accent1"/>
+          </a:fillRef>
+          <a:effectRef idx="0">
+            <a:schemeClr val="accent1"/>
+          </a:effectRef>
+          <a:fontRef idx="minor">
+            <a:schemeClr val="lt1"/>
+          </a:fontRef>
+        </p:style>
+        <p:txBody>
+          <a:bodyPr rtlCol="0" anchor="ctr"/>
+          <a:lstStyle/>
+          <a:p>
+            <a:pPr algn="ctr"/>
+            <a:endParaRPr lang="en-PH"/>
+          </a:p>
+        </p:txBody>
+      </p:sp>
+      <p:sp>
+        <p:nvSpPr>
+          <p:cNvPr id="43" name="TextBox 42"/>
+          <p:cNvSpPr txBox="1"/>
+          <p:nvPr/>
+        </p:nvSpPr>
+        <p:spPr>
+          <a:xfrm>
+            <a:off x="344488" y="9567643"/>
+            <a:ext cx="6781800" cy="646331"/>
+          </a:xfrm>
+          <a:prstGeom prst="rect">
+            <a:avLst/>
+          </a:prstGeom>
+          <a:noFill/>
+          <a:ln>
+            <a:noFill/>
+          </a:ln>
+        </p:spPr>
+        <p:txBody>
+          <a:bodyPr wrap="square" rtlCol="0">
+            <a:spAutoFit/>
+          </a:bodyPr>
+          <a:lstStyle/>
+          <a:p>
+            <a:r>
+              <a:rPr lang="en-PH" sz="3600" dirty="0" smtClean="0">
+                <a:ln w="3175">
+                  <a:solidFill>
+                    <a:srgbClr val="9FDF80"/>
+                  </a:solidFill>
+                </a:ln>
+                <a:solidFill>
+                  <a:schemeClr val="bg1"/>
+                </a:solidFill>
+                <a:latin typeface="Feather Bold" pitchFamily="82" charset="0"/>
+              </a:rPr>
+              <a:t>Lesson 3</a:t>
+            </a:r>
+            <a:endParaRPr lang="en-PH" sz="3600" dirty="0">
+              <a:ln w="3175">
+                <a:solidFill>
+                  <a:srgbClr val="9FDF80"/>
+                </a:solidFill>
+              </a:ln>
+              <a:solidFill>
+                <a:schemeClr val="bg1"/>
+              </a:solidFill>
+              <a:latin typeface="Feather Bold" pitchFamily="82" charset="0"/>
+            </a:endParaRPr>
+          </a:p>
+        </p:txBody>
+      </p:sp>
+      <p:sp>
+        <p:nvSpPr>
+          <p:cNvPr id="45" name="Rounded Rectangle 44"/>
+          <p:cNvSpPr/>
+          <p:nvPr/>
+        </p:nvSpPr>
+        <p:spPr>
+          <a:xfrm>
+            <a:off x="187806" y="13298891"/>
+            <a:ext cx="9878048" cy="3351989"/>
+          </a:xfrm>
+          <a:prstGeom prst="roundRect">
+            <a:avLst>
+              <a:gd name="adj" fmla="val 9952"/>
+            </a:avLst>
+          </a:prstGeom>
+          <a:blipFill dpi="0" rotWithShape="1">
+            <a:blip r:embed="rId6">
+              <a:extLst>
+                <a:ext uri="{28A0092B-C50C-407E-A947-70E740481C1C}">
+                  <a14:useLocalDpi xmlns:a14="http://schemas.microsoft.com/office/drawing/2010/main" val="0"/>
+                </a:ext>
+              </a:extLst>
+            </a:blip>
+            <a:srcRect/>
+            <a:stretch>
+              <a:fillRect/>
+            </a:stretch>
+          </a:blipFill>
+          <a:ln>
+            <a:solidFill>
+              <a:srgbClr val="6FCF40"/>
+            </a:solidFill>
+          </a:ln>
+        </p:spPr>
+        <p:style>
+          <a:lnRef idx="2">
+            <a:schemeClr val="accent1">
+              <a:shade val="50000"/>
+            </a:schemeClr>
+          </a:lnRef>
+          <a:fillRef idx="1">
+            <a:schemeClr val="accent1"/>
+          </a:fillRef>
+          <a:effectRef idx="0">
+            <a:schemeClr val="accent1"/>
+          </a:effectRef>
+          <a:fontRef idx="minor">
+            <a:schemeClr val="lt1"/>
+          </a:fontRef>
+        </p:style>
+        <p:txBody>
+          <a:bodyPr rtlCol="0" anchor="ctr"/>
+          <a:lstStyle/>
+          <a:p>
+            <a:pPr algn="ctr"/>
+            <a:endParaRPr lang="en-PH" b="1"/>
+          </a:p>
+        </p:txBody>
+      </p:sp>
+      <p:sp>
+        <p:nvSpPr>
+          <p:cNvPr id="46" name="TextBox 45"/>
+          <p:cNvSpPr txBox="1"/>
+          <p:nvPr/>
+        </p:nvSpPr>
+        <p:spPr>
+          <a:xfrm>
+            <a:off x="326230" y="13452255"/>
+            <a:ext cx="6781800" cy="646331"/>
+          </a:xfrm>
+          <a:prstGeom prst="rect">
+            <a:avLst/>
+          </a:prstGeom>
+          <a:noFill/>
+          <a:ln>
+            <a:noFill/>
+          </a:ln>
+        </p:spPr>
+        <p:txBody>
+          <a:bodyPr wrap="square" rtlCol="0">
+            <a:spAutoFit/>
+          </a:bodyPr>
+          <a:lstStyle/>
+          <a:p>
+            <a:r>
+              <a:rPr lang="en-PH" sz="3600" b="1" dirty="0" smtClean="0">
+                <a:ln w="3175">
+                  <a:solidFill>
+                    <a:srgbClr val="9FDF80"/>
+                  </a:solidFill>
+                </a:ln>
+                <a:solidFill>
+                  <a:schemeClr val="bg1"/>
+                </a:solidFill>
+                <a:latin typeface="Feather Bold" pitchFamily="82" charset="0"/>
+              </a:rPr>
+              <a:t>Lesson 4</a:t>
+            </a:r>
+            <a:endParaRPr lang="en-PH" sz="3600" b="1" dirty="0">
+              <a:ln w="3175">
+                <a:solidFill>
+                  <a:srgbClr val="9FDF80"/>
+                </a:solidFill>
+              </a:ln>
+              <a:solidFill>
+                <a:schemeClr val="bg1"/>
+              </a:solidFill>
+              <a:latin typeface="Feather Bold" pitchFamily="82" charset="0"/>
+            </a:endParaRPr>
+          </a:p>
+        </p:txBody>
+      </p:sp>
+    </p:spTree>
+    <p:extLst>
+      <p:ext uri="{BB962C8B-B14F-4D97-AF65-F5344CB8AC3E}">
+        <p14:creationId xmlns:p14="http://schemas.microsoft.com/office/powerpoint/2010/main" val="3158800173"/>
+      </p:ext>
+    </p:extLst>
+  </p:cSld>
+  <p:clrMapOvr>
+    <a:masterClrMapping/>
+  </p:clrMapOvr>
+  <p:timing>
+    <p:tnLst>
+      <p:par>
+        <p:cTn id="1" dur="indefinite" restart="never" nodeType="tmRoot"/>
+      </p:par>
+    </p:tnLst>
+  </p:timing>
+</p:sld>
+</file>
+
+<file path=ppt/slides/slide5.xml><?xml version="1.0" encoding="utf-8"?>
+<p:sld xmlns:a="http://schemas.openxmlformats.org/drawingml/2006/main" xmlns:r="http://schemas.openxmlformats.org/officeDocument/2006/relationships" xmlns:p="http://schemas.openxmlformats.org/presentationml/2006/main">
+  <p:cSld>
+    <p:spTree>
+      <p:nvGrpSpPr>
+        <p:cNvPr id="1" name=""/>
+        <p:cNvGrpSpPr/>
+        <p:nvPr/>
+      </p:nvGrpSpPr>
+      <p:grpSpPr>
+        <a:xfrm>
+          <a:off x="0" y="0"/>
+          <a:ext cx="0" cy="0"/>
+          <a:chOff x="0" y="0"/>
+          <a:chExt cx="0" cy="0"/>
+        </a:xfrm>
+      </p:grpSpPr>
+      <p:grpSp>
+        <p:nvGrpSpPr>
+          <p:cNvPr id="8" name="Group 7"/>
+          <p:cNvGrpSpPr/>
+          <p:nvPr/>
+        </p:nvGrpSpPr>
+        <p:grpSpPr>
+          <a:xfrm>
+            <a:off x="-36515" y="0"/>
+            <a:ext cx="10326690" cy="915987"/>
+            <a:chOff x="-36515" y="0"/>
+            <a:chExt cx="10326690" cy="915987"/>
+          </a:xfrm>
+        </p:grpSpPr>
+        <p:sp>
+          <p:nvSpPr>
+            <p:cNvPr id="9" name="Rectangle 8"/>
+            <p:cNvSpPr/>
+            <p:nvPr/>
+          </p:nvSpPr>
+          <p:spPr>
+            <a:xfrm>
+              <a:off x="-36515" y="0"/>
+              <a:ext cx="10326690" cy="915987"/>
+            </a:xfrm>
+            <a:prstGeom prst="rect">
+              <a:avLst/>
+            </a:prstGeom>
+            <a:solidFill>
+              <a:srgbClr val="21A316"/>
+            </a:solidFill>
+            <a:ln>
+              <a:noFill/>
+            </a:ln>
+          </p:spPr>
+          <p:style>
+            <a:lnRef idx="2">
+              <a:schemeClr val="accent1">
+                <a:shade val="50000"/>
+              </a:schemeClr>
+            </a:lnRef>
+            <a:fillRef idx="1">
+              <a:schemeClr val="accent1"/>
+            </a:fillRef>
+            <a:effectRef idx="0">
+              <a:schemeClr val="accent1"/>
+            </a:effectRef>
+            <a:fontRef idx="minor">
+              <a:schemeClr val="lt1"/>
+            </a:fontRef>
+          </p:style>
+          <p:txBody>
+            <a:bodyPr rtlCol="0" anchor="ctr"/>
+            <a:lstStyle/>
+            <a:p>
+              <a:pPr algn="ctr"/>
+              <a:endParaRPr lang="en-PH"/>
+            </a:p>
+          </p:txBody>
+        </p:sp>
+        <p:sp>
+          <p:nvSpPr>
+            <p:cNvPr id="10" name="TextBox 9"/>
+            <p:cNvSpPr txBox="1"/>
+            <p:nvPr/>
+          </p:nvSpPr>
+          <p:spPr>
+            <a:xfrm>
+              <a:off x="1258887" y="153987"/>
+              <a:ext cx="6781800" cy="646331"/>
+            </a:xfrm>
+            <a:prstGeom prst="rect">
+              <a:avLst/>
+            </a:prstGeom>
+            <a:noFill/>
+          </p:spPr>
+          <p:txBody>
+            <a:bodyPr wrap="square" rtlCol="0">
+              <a:spAutoFit/>
+            </a:bodyPr>
+            <a:lstStyle/>
+            <a:p>
+              <a:r>
+                <a:rPr lang="en-PH" sz="3600" dirty="0" smtClean="0">
+                  <a:solidFill>
+                    <a:schemeClr val="bg1"/>
+                  </a:solidFill>
+                  <a:latin typeface="Feather Bold" pitchFamily="82" charset="0"/>
+                </a:rPr>
+                <a:t>HANDSY</a:t>
+              </a:r>
+              <a:endParaRPr lang="en-PH" sz="3600" dirty="0">
+                <a:solidFill>
+                  <a:schemeClr val="bg1"/>
+                </a:solidFill>
+                <a:latin typeface="Feather Bold" pitchFamily="82" charset="0"/>
+              </a:endParaRPr>
+            </a:p>
+          </p:txBody>
+        </p:sp>
+        <p:pic>
+          <p:nvPicPr>
+            <p:cNvPr id="11" name="Picture 2" descr="F:\Installers\Miscellaneous Resources\mascot_official.png"/>
+            <p:cNvPicPr>
+              <a:picLocks noChangeAspect="1" noChangeArrowheads="1"/>
+            </p:cNvPicPr>
+            <p:nvPr/>
+          </p:nvPicPr>
+          <p:blipFill rotWithShape="1">
+            <a:blip r:embed="rId2" cstate="print">
+              <a:extLst>
+                <a:ext uri="{28A0092B-C50C-407E-A947-70E740481C1C}">
+                  <a14:useLocalDpi xmlns:a14="http://schemas.microsoft.com/office/drawing/2010/main" val="0"/>
+                </a:ext>
+              </a:extLst>
+            </a:blip>
+            <a:srcRect l="16482" t="11469" r="15709" b="15037"/>
+            <a:stretch/>
+          </p:blipFill>
+          <p:spPr bwMode="auto">
+            <a:xfrm>
+              <a:off x="456858" y="46717"/>
+              <a:ext cx="802029" cy="869270"/>
+            </a:xfrm>
+            <a:prstGeom prst="rect">
+              <a:avLst/>
+            </a:prstGeom>
+            <a:noFill/>
+            <a:extLst>
+              <a:ext uri="{909E8E84-426E-40DD-AFC4-6F175D3DCCD1}">
+                <a14:hiddenFill xmlns:a14="http://schemas.microsoft.com/office/drawing/2010/main">
+                  <a:solidFill>
+                    <a:srgbClr val="FFFFFF"/>
+                  </a:solidFill>
+                </a14:hiddenFill>
+              </a:ext>
+            </a:extLst>
+          </p:spPr>
+        </p:pic>
+      </p:grpSp>
+      <p:sp>
+        <p:nvSpPr>
+          <p:cNvPr id="32" name="Rounded Rectangle 31"/>
+          <p:cNvSpPr/>
+          <p:nvPr/>
+        </p:nvSpPr>
+        <p:spPr>
+          <a:xfrm>
+            <a:off x="206063" y="1640292"/>
+            <a:ext cx="9878048" cy="7238188"/>
+          </a:xfrm>
+          <a:prstGeom prst="roundRect">
+            <a:avLst>
+              <a:gd name="adj" fmla="val 9952"/>
+            </a:avLst>
+          </a:prstGeom>
+          <a:solidFill>
+            <a:srgbClr val="9FDF80"/>
+          </a:solidFill>
+          <a:ln>
+            <a:solidFill>
+              <a:srgbClr val="6FCF40"/>
+            </a:solidFill>
+          </a:ln>
+        </p:spPr>
+        <p:style>
+          <a:lnRef idx="2">
+            <a:schemeClr val="accent1">
+              <a:shade val="50000"/>
+            </a:schemeClr>
+          </a:lnRef>
+          <a:fillRef idx="1">
+            <a:schemeClr val="accent1"/>
+          </a:fillRef>
+          <a:effectRef idx="0">
+            <a:schemeClr val="accent1"/>
+          </a:effectRef>
+          <a:fontRef idx="minor">
+            <a:schemeClr val="lt1"/>
+          </a:fontRef>
+        </p:style>
+        <p:txBody>
+          <a:bodyPr rtlCol="0" anchor="ctr"/>
+          <a:lstStyle/>
+          <a:p>
+            <a:pPr algn="ctr"/>
+            <a:endParaRPr lang="en-PH"/>
+          </a:p>
+        </p:txBody>
+      </p:sp>
+      <p:sp>
+        <p:nvSpPr>
+          <p:cNvPr id="36" name="TextBox 35"/>
+          <p:cNvSpPr txBox="1"/>
+          <p:nvPr/>
+        </p:nvSpPr>
+        <p:spPr>
+          <a:xfrm>
+            <a:off x="1754188" y="4936220"/>
+            <a:ext cx="6781800" cy="646331"/>
+          </a:xfrm>
+          <a:prstGeom prst="rect">
+            <a:avLst/>
+          </a:prstGeom>
+          <a:noFill/>
+          <a:ln>
+            <a:noFill/>
+          </a:ln>
+        </p:spPr>
+        <p:txBody>
+          <a:bodyPr wrap="square" rtlCol="0">
+            <a:spAutoFit/>
+          </a:bodyPr>
+          <a:lstStyle/>
+          <a:p>
+            <a:pPr algn="ctr"/>
+            <a:r>
+              <a:rPr lang="en-PH" sz="3600" dirty="0" smtClean="0">
+                <a:ln w="3175">
+                  <a:noFill/>
+                </a:ln>
+                <a:solidFill>
+                  <a:schemeClr val="bg1"/>
+                </a:solidFill>
+                <a:latin typeface="Feather Bold" pitchFamily="82" charset="0"/>
+              </a:rPr>
+              <a:t>(picture of hand sign)</a:t>
+            </a:r>
+            <a:endParaRPr lang="en-PH" sz="3600" dirty="0">
+              <a:ln w="3175">
+                <a:noFill/>
+              </a:ln>
+              <a:solidFill>
+                <a:schemeClr val="bg1"/>
+              </a:solidFill>
+              <a:latin typeface="Feather Bold" pitchFamily="82" charset="0"/>
+            </a:endParaRPr>
+          </a:p>
+        </p:txBody>
+      </p:sp>
+      <p:sp>
+        <p:nvSpPr>
+          <p:cNvPr id="42" name="Rounded Rectangle 41"/>
+          <p:cNvSpPr/>
+          <p:nvPr/>
+        </p:nvSpPr>
+        <p:spPr>
+          <a:xfrm>
+            <a:off x="206064" y="9414279"/>
+            <a:ext cx="9878048" cy="7236601"/>
+          </a:xfrm>
+          <a:prstGeom prst="roundRect">
+            <a:avLst>
+              <a:gd name="adj" fmla="val 9952"/>
+            </a:avLst>
+          </a:prstGeom>
+          <a:noFill/>
+          <a:ln>
+            <a:noFill/>
+          </a:ln>
+        </p:spPr>
+        <p:style>
+          <a:lnRef idx="2">
+            <a:schemeClr val="accent1">
+              <a:shade val="50000"/>
+            </a:schemeClr>
+          </a:lnRef>
+          <a:fillRef idx="1">
+            <a:schemeClr val="accent1"/>
+          </a:fillRef>
+          <a:effectRef idx="0">
+            <a:schemeClr val="accent1"/>
+          </a:effectRef>
+          <a:fontRef idx="minor">
+            <a:schemeClr val="lt1"/>
+          </a:fontRef>
+        </p:style>
+        <p:txBody>
+          <a:bodyPr rtlCol="0" anchor="ctr"/>
+          <a:lstStyle/>
+          <a:p>
+            <a:pPr algn="just"/>
+            <a:r>
+              <a:rPr lang="en-PH" sz="4000" dirty="0" smtClean="0">
+                <a:solidFill>
+                  <a:sysClr val="windowText" lastClr="000000"/>
+                </a:solidFill>
+                <a:latin typeface="Celebes" pitchFamily="50" charset="0"/>
+              </a:rPr>
+              <a:t>(description  of lesson</a:t>
+            </a:r>
+            <a:r>
+              <a:rPr lang="en-PH" sz="4000" dirty="0">
+                <a:solidFill>
+                  <a:sysClr val="windowText" lastClr="000000"/>
+                </a:solidFill>
+                <a:latin typeface="Celebes" pitchFamily="50" charset="0"/>
+              </a:rPr>
+              <a:t> description of </a:t>
+            </a:r>
+            <a:r>
+              <a:rPr lang="en-PH" sz="4000" dirty="0" smtClean="0">
+                <a:solidFill>
+                  <a:sysClr val="windowText" lastClr="000000"/>
+                </a:solidFill>
+                <a:latin typeface="Celebes" pitchFamily="50" charset="0"/>
+              </a:rPr>
+              <a:t>lesson</a:t>
+            </a:r>
+            <a:r>
+              <a:rPr lang="en-PH" sz="4000" dirty="0">
+                <a:solidFill>
+                  <a:sysClr val="windowText" lastClr="000000"/>
+                </a:solidFill>
+                <a:latin typeface="Celebes" pitchFamily="50" charset="0"/>
+              </a:rPr>
+              <a:t> description of </a:t>
+            </a:r>
+            <a:r>
+              <a:rPr lang="en-PH" sz="4000" dirty="0" smtClean="0">
+                <a:solidFill>
+                  <a:sysClr val="windowText" lastClr="000000"/>
+                </a:solidFill>
+                <a:latin typeface="Celebes" pitchFamily="50" charset="0"/>
+              </a:rPr>
+              <a:t>lesson</a:t>
+            </a:r>
+            <a:r>
+              <a:rPr lang="en-PH" sz="4000" dirty="0">
+                <a:solidFill>
+                  <a:sysClr val="windowText" lastClr="000000"/>
+                </a:solidFill>
+                <a:latin typeface="Celebes" pitchFamily="50" charset="0"/>
+              </a:rPr>
+              <a:t> description of </a:t>
+            </a:r>
+            <a:r>
+              <a:rPr lang="en-PH" sz="4000" dirty="0" smtClean="0">
+                <a:solidFill>
+                  <a:sysClr val="windowText" lastClr="000000"/>
+                </a:solidFill>
+                <a:latin typeface="Celebes" pitchFamily="50" charset="0"/>
+              </a:rPr>
+              <a:t>lesson</a:t>
+            </a:r>
+            <a:r>
+              <a:rPr lang="en-PH" sz="4000" dirty="0">
+                <a:solidFill>
+                  <a:sysClr val="windowText" lastClr="000000"/>
+                </a:solidFill>
+                <a:latin typeface="Celebes" pitchFamily="50" charset="0"/>
+              </a:rPr>
+              <a:t> description of </a:t>
+            </a:r>
+            <a:r>
+              <a:rPr lang="en-PH" sz="4000" dirty="0" smtClean="0">
+                <a:solidFill>
+                  <a:sysClr val="windowText" lastClr="000000"/>
+                </a:solidFill>
+                <a:latin typeface="Celebes" pitchFamily="50" charset="0"/>
+              </a:rPr>
+              <a:t>lesson</a:t>
+            </a:r>
+            <a:r>
+              <a:rPr lang="en-PH" sz="4000" dirty="0">
+                <a:solidFill>
+                  <a:sysClr val="windowText" lastClr="000000"/>
+                </a:solidFill>
+                <a:latin typeface="Celebes" pitchFamily="50" charset="0"/>
+              </a:rPr>
+              <a:t> description of </a:t>
+            </a:r>
+            <a:r>
+              <a:rPr lang="en-PH" sz="4000" dirty="0" smtClean="0">
+                <a:solidFill>
+                  <a:sysClr val="windowText" lastClr="000000"/>
+                </a:solidFill>
+                <a:latin typeface="Celebes" pitchFamily="50" charset="0"/>
+              </a:rPr>
+              <a:t>lesson</a:t>
+            </a:r>
+            <a:r>
+              <a:rPr lang="en-PH" sz="4000" dirty="0">
+                <a:solidFill>
+                  <a:sysClr val="windowText" lastClr="000000"/>
+                </a:solidFill>
+                <a:latin typeface="Celebes" pitchFamily="50" charset="0"/>
+              </a:rPr>
+              <a:t> description of </a:t>
+            </a:r>
+            <a:r>
+              <a:rPr lang="en-PH" sz="4000" dirty="0" smtClean="0">
+                <a:solidFill>
+                  <a:sysClr val="windowText" lastClr="000000"/>
+                </a:solidFill>
+                <a:latin typeface="Celebes" pitchFamily="50" charset="0"/>
+              </a:rPr>
+              <a:t>lesson</a:t>
+            </a:r>
+            <a:r>
+              <a:rPr lang="en-PH" sz="4000" dirty="0">
+                <a:solidFill>
+                  <a:sysClr val="windowText" lastClr="000000"/>
+                </a:solidFill>
+                <a:latin typeface="Celebes" pitchFamily="50" charset="0"/>
+              </a:rPr>
+              <a:t> description of </a:t>
+            </a:r>
+            <a:r>
+              <a:rPr lang="en-PH" sz="4000" dirty="0" smtClean="0">
+                <a:solidFill>
+                  <a:sysClr val="windowText" lastClr="000000"/>
+                </a:solidFill>
+                <a:latin typeface="Celebes" pitchFamily="50" charset="0"/>
+              </a:rPr>
+              <a:t>lesson</a:t>
+            </a:r>
+            <a:r>
+              <a:rPr lang="en-PH" sz="4000" dirty="0">
+                <a:solidFill>
+                  <a:sysClr val="windowText" lastClr="000000"/>
+                </a:solidFill>
+                <a:latin typeface="Celebes" pitchFamily="50" charset="0"/>
+              </a:rPr>
+              <a:t> description of </a:t>
+            </a:r>
+            <a:r>
+              <a:rPr lang="en-PH" sz="4000" dirty="0" smtClean="0">
+                <a:solidFill>
+                  <a:sysClr val="windowText" lastClr="000000"/>
+                </a:solidFill>
+                <a:latin typeface="Celebes" pitchFamily="50" charset="0"/>
+              </a:rPr>
+              <a:t>lesson</a:t>
+            </a:r>
+            <a:r>
+              <a:rPr lang="en-PH" sz="4000" dirty="0">
+                <a:solidFill>
+                  <a:sysClr val="windowText" lastClr="000000"/>
+                </a:solidFill>
+                <a:latin typeface="Celebes" pitchFamily="50" charset="0"/>
+              </a:rPr>
+              <a:t> description of </a:t>
+            </a:r>
+            <a:r>
+              <a:rPr lang="en-PH" sz="4000" dirty="0" smtClean="0">
+                <a:solidFill>
+                  <a:sysClr val="windowText" lastClr="000000"/>
+                </a:solidFill>
+                <a:latin typeface="Celebes" pitchFamily="50" charset="0"/>
+              </a:rPr>
+              <a:t>lesson</a:t>
+            </a:r>
+            <a:r>
+              <a:rPr lang="en-PH" sz="4000" dirty="0">
+                <a:solidFill>
+                  <a:sysClr val="windowText" lastClr="000000"/>
+                </a:solidFill>
+                <a:latin typeface="Celebes" pitchFamily="50" charset="0"/>
+              </a:rPr>
+              <a:t> description of </a:t>
+            </a:r>
+            <a:r>
+              <a:rPr lang="en-PH" sz="4000" dirty="0" smtClean="0">
+                <a:solidFill>
+                  <a:sysClr val="windowText" lastClr="000000"/>
+                </a:solidFill>
+                <a:latin typeface="Celebes" pitchFamily="50" charset="0"/>
+              </a:rPr>
+              <a:t>lesson</a:t>
+            </a:r>
+            <a:r>
+              <a:rPr lang="en-PH" sz="4000" dirty="0">
+                <a:solidFill>
+                  <a:sysClr val="windowText" lastClr="000000"/>
+                </a:solidFill>
+                <a:latin typeface="Celebes" pitchFamily="50" charset="0"/>
+              </a:rPr>
+              <a:t> description of </a:t>
+            </a:r>
+            <a:r>
+              <a:rPr lang="en-PH" sz="4000" dirty="0" smtClean="0">
+                <a:solidFill>
+                  <a:sysClr val="windowText" lastClr="000000"/>
+                </a:solidFill>
+                <a:latin typeface="Celebes" pitchFamily="50" charset="0"/>
+              </a:rPr>
+              <a:t>lesson</a:t>
+            </a:r>
+            <a:r>
+              <a:rPr lang="en-PH" sz="4000" dirty="0">
+                <a:solidFill>
+                  <a:sysClr val="windowText" lastClr="000000"/>
+                </a:solidFill>
+                <a:latin typeface="Celebes" pitchFamily="50" charset="0"/>
+              </a:rPr>
+              <a:t> description of </a:t>
+            </a:r>
+            <a:r>
+              <a:rPr lang="en-PH" sz="4000" dirty="0" smtClean="0">
+                <a:solidFill>
+                  <a:sysClr val="windowText" lastClr="000000"/>
+                </a:solidFill>
+                <a:latin typeface="Celebes" pitchFamily="50" charset="0"/>
+              </a:rPr>
+              <a:t>lesson</a:t>
+            </a:r>
+            <a:r>
+              <a:rPr lang="en-PH" sz="4000" dirty="0">
+                <a:solidFill>
+                  <a:sysClr val="windowText" lastClr="000000"/>
+                </a:solidFill>
+                <a:latin typeface="Celebes" pitchFamily="50" charset="0"/>
+              </a:rPr>
+              <a:t> description of </a:t>
+            </a:r>
+            <a:r>
+              <a:rPr lang="en-PH" sz="4000" dirty="0" smtClean="0">
+                <a:solidFill>
+                  <a:sysClr val="windowText" lastClr="000000"/>
+                </a:solidFill>
+                <a:latin typeface="Celebes" pitchFamily="50" charset="0"/>
+              </a:rPr>
+              <a:t>lesson</a:t>
+            </a:r>
+            <a:r>
+              <a:rPr lang="en-PH" sz="4000" dirty="0">
+                <a:solidFill>
+                  <a:sysClr val="windowText" lastClr="000000"/>
+                </a:solidFill>
+                <a:latin typeface="Celebes" pitchFamily="50" charset="0"/>
+              </a:rPr>
+              <a:t> description of </a:t>
+            </a:r>
+            <a:r>
+              <a:rPr lang="en-PH" sz="4000" dirty="0" smtClean="0">
+                <a:solidFill>
+                  <a:sysClr val="windowText" lastClr="000000"/>
+                </a:solidFill>
+                <a:latin typeface="Celebes" pitchFamily="50" charset="0"/>
+              </a:rPr>
+              <a:t>lesson</a:t>
+            </a:r>
+            <a:r>
+              <a:rPr lang="en-PH" sz="4000" dirty="0">
+                <a:solidFill>
+                  <a:sysClr val="windowText" lastClr="000000"/>
+                </a:solidFill>
+                <a:latin typeface="Celebes" pitchFamily="50" charset="0"/>
+              </a:rPr>
+              <a:t> description of </a:t>
+            </a:r>
+            <a:r>
+              <a:rPr lang="en-PH" sz="4000" dirty="0" smtClean="0">
+                <a:solidFill>
+                  <a:sysClr val="windowText" lastClr="000000"/>
+                </a:solidFill>
+                <a:latin typeface="Celebes" pitchFamily="50" charset="0"/>
+              </a:rPr>
+              <a:t>lesson</a:t>
+            </a:r>
+            <a:r>
+              <a:rPr lang="en-PH" sz="4000" dirty="0">
+                <a:solidFill>
+                  <a:sysClr val="windowText" lastClr="000000"/>
+                </a:solidFill>
+                <a:latin typeface="Celebes" pitchFamily="50" charset="0"/>
+              </a:rPr>
+              <a:t> description of </a:t>
+            </a:r>
+            <a:r>
+              <a:rPr lang="en-PH" sz="4000" dirty="0" smtClean="0">
+                <a:solidFill>
+                  <a:sysClr val="windowText" lastClr="000000"/>
+                </a:solidFill>
+                <a:latin typeface="Celebes" pitchFamily="50" charset="0"/>
+              </a:rPr>
+              <a:t>lesson</a:t>
+            </a:r>
+            <a:r>
+              <a:rPr lang="en-PH" sz="4000" dirty="0">
+                <a:solidFill>
+                  <a:sysClr val="windowText" lastClr="000000"/>
+                </a:solidFill>
+                <a:latin typeface="Celebes" pitchFamily="50" charset="0"/>
+              </a:rPr>
+              <a:t> description of </a:t>
+            </a:r>
+            <a:r>
+              <a:rPr lang="en-PH" sz="4000" dirty="0" smtClean="0">
+                <a:solidFill>
+                  <a:sysClr val="windowText" lastClr="000000"/>
+                </a:solidFill>
+                <a:latin typeface="Celebes" pitchFamily="50" charset="0"/>
+              </a:rPr>
+              <a:t>lesson</a:t>
+            </a:r>
+            <a:r>
+              <a:rPr lang="en-PH" sz="4000" dirty="0">
+                <a:solidFill>
+                  <a:sysClr val="windowText" lastClr="000000"/>
+                </a:solidFill>
+                <a:latin typeface="Celebes" pitchFamily="50" charset="0"/>
+              </a:rPr>
+              <a:t> description of </a:t>
+            </a:r>
+            <a:r>
+              <a:rPr lang="en-PH" sz="4000" dirty="0" smtClean="0">
+                <a:solidFill>
+                  <a:sysClr val="windowText" lastClr="000000"/>
+                </a:solidFill>
+                <a:latin typeface="Celebes" pitchFamily="50" charset="0"/>
+              </a:rPr>
+              <a:t>lesson</a:t>
+            </a:r>
+            <a:r>
+              <a:rPr lang="en-PH" sz="4000" dirty="0">
+                <a:solidFill>
+                  <a:sysClr val="windowText" lastClr="000000"/>
+                </a:solidFill>
+                <a:latin typeface="Celebes" pitchFamily="50" charset="0"/>
+              </a:rPr>
+              <a:t> </a:t>
+            </a:r>
+            <a:r>
+              <a:rPr lang="en-PH" sz="4000" dirty="0" smtClean="0">
+                <a:solidFill>
+                  <a:sysClr val="windowText" lastClr="000000"/>
+                </a:solidFill>
+                <a:latin typeface="Celebes" pitchFamily="50" charset="0"/>
+              </a:rPr>
+              <a:t>description </a:t>
+            </a:r>
+            <a:r>
+              <a:rPr lang="en-PH" sz="4000" dirty="0">
+                <a:solidFill>
+                  <a:sysClr val="windowText" lastClr="000000"/>
+                </a:solidFill>
+                <a:latin typeface="Celebes" pitchFamily="50" charset="0"/>
+              </a:rPr>
+              <a:t>of </a:t>
+            </a:r>
+            <a:r>
+              <a:rPr lang="en-PH" sz="4000" dirty="0" smtClean="0">
+                <a:solidFill>
+                  <a:sysClr val="windowText" lastClr="000000"/>
+                </a:solidFill>
+                <a:latin typeface="Celebes" pitchFamily="50" charset="0"/>
+              </a:rPr>
+              <a:t>lesson)</a:t>
+            </a:r>
+            <a:endParaRPr lang="en-PH" sz="4000" dirty="0">
+              <a:solidFill>
+                <a:sysClr val="windowText" lastClr="000000"/>
+              </a:solidFill>
+              <a:latin typeface="Celebes" pitchFamily="50" charset="0"/>
+            </a:endParaRPr>
+          </a:p>
+        </p:txBody>
+      </p:sp>
+      <p:sp>
+        <p:nvSpPr>
+          <p:cNvPr id="18" name="Rounded Rectangle 17"/>
+          <p:cNvSpPr/>
+          <p:nvPr/>
+        </p:nvSpPr>
+        <p:spPr>
+          <a:xfrm>
+            <a:off x="206062" y="16994187"/>
+            <a:ext cx="9878049" cy="975792"/>
+          </a:xfrm>
+          <a:prstGeom prst="roundRect">
+            <a:avLst/>
+          </a:prstGeom>
+          <a:solidFill>
+            <a:srgbClr val="21A316"/>
+          </a:solidFill>
+          <a:ln>
+            <a:noFill/>
+          </a:ln>
+        </p:spPr>
+        <p:style>
+          <a:lnRef idx="2">
+            <a:schemeClr val="accent1">
+              <a:shade val="50000"/>
+            </a:schemeClr>
+          </a:lnRef>
+          <a:fillRef idx="1">
+            <a:schemeClr val="accent1"/>
+          </a:fillRef>
+          <a:effectRef idx="0">
+            <a:schemeClr val="accent1"/>
+          </a:effectRef>
+          <a:fontRef idx="minor">
+            <a:schemeClr val="lt1"/>
+          </a:fontRef>
+        </p:style>
+        <p:txBody>
+          <a:bodyPr rtlCol="0" anchor="ctr"/>
+          <a:lstStyle/>
+          <a:p>
+            <a:pPr algn="ctr"/>
+            <a:r>
+              <a:rPr lang="en-PH" sz="4400" dirty="0" smtClean="0">
+                <a:solidFill>
+                  <a:schemeClr val="bg1"/>
+                </a:solidFill>
+                <a:latin typeface="Feather Bold" pitchFamily="82" charset="0"/>
+              </a:rPr>
+              <a:t>CONTINUE</a:t>
+            </a:r>
+            <a:endParaRPr lang="en-PH" sz="4400" dirty="0">
+              <a:solidFill>
+                <a:schemeClr val="bg1"/>
+              </a:solidFill>
+              <a:latin typeface="Feather Bold" pitchFamily="82" charset="0"/>
+            </a:endParaRPr>
+          </a:p>
+        </p:txBody>
+      </p:sp>
+    </p:spTree>
+    <p:extLst>
+      <p:ext uri="{BB962C8B-B14F-4D97-AF65-F5344CB8AC3E}">
+        <p14:creationId xmlns:p14="http://schemas.microsoft.com/office/powerpoint/2010/main" val="295113103"/>
+      </p:ext>
+    </p:extLst>
+  </p:cSld>
+  <p:clrMapOvr>
+    <a:masterClrMapping/>
+  </p:clrMapOvr>
+  <p:timing>
+    <p:tnLst>
+      <p:par>
+        <p:cTn id="1" dur="indefinite" restart="never" nodeType="tmRoot"/>
+      </p:par>
+    </p:tnLst>
+  </p:timing>
+</p:sld>
+</file>
+
+<file path=ppt/slides/slide6.xml><?xml version="1.0" encoding="utf-8"?>
+<p:sld xmlns:a="http://schemas.openxmlformats.org/drawingml/2006/main" xmlns:r="http://schemas.openxmlformats.org/officeDocument/2006/relationships" xmlns:p="http://schemas.openxmlformats.org/presentationml/2006/main">
+  <p:cSld>
+    <p:spTree>
+      <p:nvGrpSpPr>
+        <p:cNvPr id="1" name=""/>
+        <p:cNvGrpSpPr/>
+        <p:nvPr/>
+      </p:nvGrpSpPr>
+      <p:grpSpPr>
+        <a:xfrm>
+          <a:off x="0" y="0"/>
+          <a:ext cx="0" cy="0"/>
+          <a:chOff x="0" y="0"/>
+          <a:chExt cx="0" cy="0"/>
+        </a:xfrm>
+      </p:grpSpPr>
+      <p:grpSp>
+        <p:nvGrpSpPr>
+          <p:cNvPr id="8" name="Group 7"/>
+          <p:cNvGrpSpPr/>
+          <p:nvPr/>
+        </p:nvGrpSpPr>
+        <p:grpSpPr>
+          <a:xfrm>
+            <a:off x="-36515" y="0"/>
+            <a:ext cx="10326690" cy="915987"/>
+            <a:chOff x="-36515" y="0"/>
+            <a:chExt cx="10326690" cy="915987"/>
+          </a:xfrm>
+        </p:grpSpPr>
+        <p:sp>
+          <p:nvSpPr>
+            <p:cNvPr id="9" name="Rectangle 8"/>
+            <p:cNvSpPr/>
+            <p:nvPr/>
+          </p:nvSpPr>
+          <p:spPr>
+            <a:xfrm>
+              <a:off x="-36515" y="0"/>
+              <a:ext cx="10326690" cy="915987"/>
+            </a:xfrm>
+            <a:prstGeom prst="rect">
+              <a:avLst/>
+            </a:prstGeom>
+            <a:solidFill>
+              <a:srgbClr val="21A316"/>
+            </a:solidFill>
+            <a:ln>
+              <a:noFill/>
+            </a:ln>
+          </p:spPr>
+          <p:style>
+            <a:lnRef idx="2">
+              <a:schemeClr val="accent1">
+                <a:shade val="50000"/>
+              </a:schemeClr>
+            </a:lnRef>
+            <a:fillRef idx="1">
+              <a:schemeClr val="accent1"/>
+            </a:fillRef>
+            <a:effectRef idx="0">
+              <a:schemeClr val="accent1"/>
+            </a:effectRef>
+            <a:fontRef idx="minor">
+              <a:schemeClr val="lt1"/>
+            </a:fontRef>
+          </p:style>
+          <p:txBody>
+            <a:bodyPr rtlCol="0" anchor="ctr"/>
+            <a:lstStyle/>
+            <a:p>
+              <a:pPr algn="ctr"/>
+              <a:endParaRPr lang="en-PH"/>
+            </a:p>
+          </p:txBody>
+        </p:sp>
+        <p:sp>
+          <p:nvSpPr>
+            <p:cNvPr id="10" name="TextBox 9"/>
+            <p:cNvSpPr txBox="1"/>
+            <p:nvPr/>
+          </p:nvSpPr>
+          <p:spPr>
+            <a:xfrm>
+              <a:off x="1258887" y="153987"/>
+              <a:ext cx="6781800" cy="646331"/>
+            </a:xfrm>
+            <a:prstGeom prst="rect">
+              <a:avLst/>
+            </a:prstGeom>
+            <a:noFill/>
+          </p:spPr>
+          <p:txBody>
+            <a:bodyPr wrap="square" rtlCol="0">
+              <a:spAutoFit/>
+            </a:bodyPr>
+            <a:lstStyle/>
+            <a:p>
+              <a:r>
+                <a:rPr lang="en-PH" sz="3600" dirty="0" smtClean="0">
+                  <a:solidFill>
+                    <a:schemeClr val="bg1"/>
+                  </a:solidFill>
+                  <a:latin typeface="Feather Bold" pitchFamily="82" charset="0"/>
+                </a:rPr>
+                <a:t>HANDSY</a:t>
+              </a:r>
+              <a:endParaRPr lang="en-PH" sz="3600" dirty="0">
+                <a:solidFill>
+                  <a:schemeClr val="bg1"/>
+                </a:solidFill>
+                <a:latin typeface="Feather Bold" pitchFamily="82" charset="0"/>
+              </a:endParaRPr>
+            </a:p>
+          </p:txBody>
+        </p:sp>
+        <p:pic>
+          <p:nvPicPr>
+            <p:cNvPr id="11" name="Picture 2" descr="F:\Installers\Miscellaneous Resources\mascot_official.png"/>
+            <p:cNvPicPr>
+              <a:picLocks noChangeAspect="1" noChangeArrowheads="1"/>
+            </p:cNvPicPr>
+            <p:nvPr/>
+          </p:nvPicPr>
+          <p:blipFill rotWithShape="1">
+            <a:blip r:embed="rId2" cstate="print">
+              <a:extLst>
+                <a:ext uri="{28A0092B-C50C-407E-A947-70E740481C1C}">
+                  <a14:useLocalDpi xmlns:a14="http://schemas.microsoft.com/office/drawing/2010/main" val="0"/>
+                </a:ext>
+              </a:extLst>
+            </a:blip>
+            <a:srcRect l="16482" t="11469" r="15709" b="15037"/>
+            <a:stretch/>
+          </p:blipFill>
+          <p:spPr bwMode="auto">
+            <a:xfrm>
+              <a:off x="456858" y="46717"/>
+              <a:ext cx="802029" cy="869270"/>
+            </a:xfrm>
+            <a:prstGeom prst="rect">
+              <a:avLst/>
+            </a:prstGeom>
+            <a:noFill/>
+            <a:extLst>
+              <a:ext uri="{909E8E84-426E-40DD-AFC4-6F175D3DCCD1}">
+                <a14:hiddenFill xmlns:a14="http://schemas.microsoft.com/office/drawing/2010/main">
+                  <a:solidFill>
+                    <a:srgbClr val="FFFFFF"/>
+                  </a:solidFill>
+                </a14:hiddenFill>
+              </a:ext>
+            </a:extLst>
+          </p:spPr>
+        </p:pic>
+      </p:grpSp>
+      <p:sp>
+        <p:nvSpPr>
+          <p:cNvPr id="32" name="Rounded Rectangle 31"/>
+          <p:cNvSpPr/>
+          <p:nvPr/>
+        </p:nvSpPr>
+        <p:spPr>
+          <a:xfrm>
+            <a:off x="206063" y="1640292"/>
+            <a:ext cx="9878048" cy="11125976"/>
+          </a:xfrm>
+          <a:prstGeom prst="roundRect">
+            <a:avLst>
+              <a:gd name="adj" fmla="val 9952"/>
+            </a:avLst>
+          </a:prstGeom>
+          <a:solidFill>
+            <a:srgbClr val="9FDF80"/>
+          </a:solidFill>
+          <a:ln>
+            <a:solidFill>
+              <a:srgbClr val="6FCF40"/>
+            </a:solidFill>
+          </a:ln>
+        </p:spPr>
+        <p:style>
+          <a:lnRef idx="2">
+            <a:schemeClr val="accent1">
+              <a:shade val="50000"/>
+            </a:schemeClr>
+          </a:lnRef>
+          <a:fillRef idx="1">
+            <a:schemeClr val="accent1"/>
+          </a:fillRef>
+          <a:effectRef idx="0">
+            <a:schemeClr val="accent1"/>
+          </a:effectRef>
+          <a:fontRef idx="minor">
+            <a:schemeClr val="lt1"/>
+          </a:fontRef>
+        </p:style>
+        <p:txBody>
+          <a:bodyPr rtlCol="0" anchor="ctr"/>
+          <a:lstStyle/>
+          <a:p>
+            <a:pPr algn="ctr"/>
+            <a:endParaRPr lang="en-PH"/>
+          </a:p>
+        </p:txBody>
+      </p:sp>
+      <p:sp>
+        <p:nvSpPr>
+          <p:cNvPr id="36" name="TextBox 35"/>
+          <p:cNvSpPr txBox="1"/>
+          <p:nvPr/>
+        </p:nvSpPr>
+        <p:spPr>
+          <a:xfrm>
+            <a:off x="649287" y="1869856"/>
+            <a:ext cx="6781800" cy="646331"/>
+          </a:xfrm>
+          <a:prstGeom prst="rect">
+            <a:avLst/>
+          </a:prstGeom>
+          <a:noFill/>
+          <a:ln>
+            <a:noFill/>
+          </a:ln>
+        </p:spPr>
+        <p:txBody>
+          <a:bodyPr wrap="square" rtlCol="0">
+            <a:spAutoFit/>
+          </a:bodyPr>
+          <a:lstStyle/>
+          <a:p>
+            <a:r>
+              <a:rPr lang="en-PH" sz="3600" dirty="0" smtClean="0">
+                <a:ln w="3175">
+                  <a:noFill/>
+                </a:ln>
+                <a:solidFill>
+                  <a:schemeClr val="bg1"/>
+                </a:solidFill>
+                <a:latin typeface="Feather Bold" pitchFamily="82" charset="0"/>
+              </a:rPr>
+              <a:t>IDENTIFY THE HAND SIGNAL</a:t>
+            </a:r>
+            <a:endParaRPr lang="en-PH" sz="3600" dirty="0">
+              <a:ln w="3175">
+                <a:noFill/>
+              </a:ln>
+              <a:solidFill>
+                <a:schemeClr val="bg1"/>
+              </a:solidFill>
+              <a:latin typeface="Feather Bold" pitchFamily="82" charset="0"/>
+            </a:endParaRPr>
+          </a:p>
+        </p:txBody>
+      </p:sp>
+      <p:sp>
+        <p:nvSpPr>
+          <p:cNvPr id="42" name="Rounded Rectangle 41"/>
+          <p:cNvSpPr/>
+          <p:nvPr/>
+        </p:nvSpPr>
+        <p:spPr>
+          <a:xfrm>
+            <a:off x="206064" y="12766268"/>
+            <a:ext cx="9878048" cy="3884612"/>
+          </a:xfrm>
+          <a:prstGeom prst="roundRect">
+            <a:avLst>
+              <a:gd name="adj" fmla="val 9952"/>
+            </a:avLst>
+          </a:prstGeom>
+          <a:noFill/>
+          <a:ln>
+            <a:noFill/>
+          </a:ln>
+        </p:spPr>
+        <p:style>
+          <a:lnRef idx="2">
+            <a:schemeClr val="accent1">
+              <a:shade val="50000"/>
+            </a:schemeClr>
+          </a:lnRef>
+          <a:fillRef idx="1">
+            <a:schemeClr val="accent1"/>
+          </a:fillRef>
+          <a:effectRef idx="0">
+            <a:schemeClr val="accent1"/>
+          </a:effectRef>
+          <a:fontRef idx="minor">
+            <a:schemeClr val="lt1"/>
+          </a:fontRef>
+        </p:style>
+        <p:txBody>
+          <a:bodyPr rtlCol="0" anchor="ctr"/>
+          <a:lstStyle/>
+          <a:p>
+            <a:pPr algn="just"/>
+            <a:endParaRPr lang="en-PH" sz="4000" dirty="0">
+              <a:solidFill>
+                <a:sysClr val="windowText" lastClr="000000"/>
+              </a:solidFill>
+              <a:latin typeface="Celebes" pitchFamily="50" charset="0"/>
+            </a:endParaRPr>
+          </a:p>
+        </p:txBody>
+      </p:sp>
+      <p:sp>
+        <p:nvSpPr>
+          <p:cNvPr id="18" name="Rounded Rectangle 17"/>
+          <p:cNvSpPr/>
+          <p:nvPr/>
+        </p:nvSpPr>
+        <p:spPr>
+          <a:xfrm>
+            <a:off x="206062" y="16994187"/>
+            <a:ext cx="9878049" cy="975792"/>
+          </a:xfrm>
+          <a:prstGeom prst="roundRect">
+            <a:avLst/>
+          </a:prstGeom>
+          <a:solidFill>
+            <a:srgbClr val="21A316"/>
+          </a:solidFill>
+          <a:ln>
+            <a:noFill/>
+          </a:ln>
+        </p:spPr>
+        <p:style>
+          <a:lnRef idx="2">
+            <a:schemeClr val="accent1">
+              <a:shade val="50000"/>
+            </a:schemeClr>
+          </a:lnRef>
+          <a:fillRef idx="1">
+            <a:schemeClr val="accent1"/>
+          </a:fillRef>
+          <a:effectRef idx="0">
+            <a:schemeClr val="accent1"/>
+          </a:effectRef>
+          <a:fontRef idx="minor">
+            <a:schemeClr val="lt1"/>
+          </a:fontRef>
+        </p:style>
+        <p:txBody>
+          <a:bodyPr rtlCol="0" anchor="ctr"/>
+          <a:lstStyle/>
+          <a:p>
+            <a:pPr algn="ctr"/>
+            <a:r>
+              <a:rPr lang="en-PH" sz="4400" dirty="0" smtClean="0">
+                <a:solidFill>
+                  <a:schemeClr val="bg1"/>
+                </a:solidFill>
+                <a:latin typeface="Feather Bold" pitchFamily="82" charset="0"/>
+              </a:rPr>
+              <a:t>CHECK</a:t>
+            </a:r>
+            <a:endParaRPr lang="en-PH" sz="4400" dirty="0">
+              <a:solidFill>
+                <a:schemeClr val="bg1"/>
+              </a:solidFill>
+              <a:latin typeface="Feather Bold" pitchFamily="82" charset="0"/>
+            </a:endParaRPr>
+          </a:p>
+        </p:txBody>
+      </p:sp>
+      <p:sp>
+        <p:nvSpPr>
+          <p:cNvPr id="14" name="Rounded Rectangle 13"/>
+          <p:cNvSpPr/>
+          <p:nvPr/>
+        </p:nvSpPr>
+        <p:spPr>
+          <a:xfrm>
+            <a:off x="227167" y="13412787"/>
+            <a:ext cx="4457824" cy="975792"/>
+          </a:xfrm>
+          <a:prstGeom prst="roundRect">
+            <a:avLst/>
+          </a:prstGeom>
+          <a:solidFill>
+            <a:srgbClr val="6FCF40"/>
+          </a:solidFill>
+          <a:ln>
+            <a:noFill/>
+          </a:ln>
+        </p:spPr>
+        <p:style>
+          <a:lnRef idx="2">
+            <a:schemeClr val="accent1">
+              <a:shade val="50000"/>
+            </a:schemeClr>
+          </a:lnRef>
+          <a:fillRef idx="1">
+            <a:schemeClr val="accent1"/>
+          </a:fillRef>
+          <a:effectRef idx="0">
+            <a:schemeClr val="accent1"/>
+          </a:effectRef>
+          <a:fontRef idx="minor">
+            <a:schemeClr val="lt1"/>
+          </a:fontRef>
+        </p:style>
+        <p:txBody>
+          <a:bodyPr rtlCol="0" anchor="ctr"/>
+          <a:lstStyle/>
+          <a:p>
+            <a:pPr algn="ctr"/>
+            <a:r>
+              <a:rPr lang="en-PH" sz="4400" dirty="0" smtClean="0">
+                <a:solidFill>
+                  <a:schemeClr val="bg1"/>
+                </a:solidFill>
+                <a:latin typeface="Celebes" pitchFamily="50" charset="0"/>
+              </a:rPr>
+              <a:t>Letter A</a:t>
+            </a:r>
+            <a:endParaRPr lang="en-PH" sz="4400" dirty="0">
+              <a:solidFill>
+                <a:schemeClr val="bg1"/>
+              </a:solidFill>
+              <a:latin typeface="Celebes" pitchFamily="50" charset="0"/>
+            </a:endParaRPr>
+          </a:p>
+        </p:txBody>
+      </p:sp>
+      <p:sp>
+        <p:nvSpPr>
+          <p:cNvPr id="15" name="Rounded Rectangle 14"/>
+          <p:cNvSpPr/>
+          <p:nvPr/>
+        </p:nvSpPr>
+        <p:spPr>
+          <a:xfrm>
+            <a:off x="209892" y="15317787"/>
+            <a:ext cx="4457824" cy="975792"/>
+          </a:xfrm>
+          <a:prstGeom prst="roundRect">
+            <a:avLst/>
+          </a:prstGeom>
+          <a:solidFill>
+            <a:srgbClr val="6FCF40"/>
+          </a:solidFill>
+          <a:ln>
+            <a:noFill/>
+          </a:ln>
+        </p:spPr>
+        <p:style>
+          <a:lnRef idx="2">
+            <a:schemeClr val="accent1">
+              <a:shade val="50000"/>
+            </a:schemeClr>
+          </a:lnRef>
+          <a:fillRef idx="1">
+            <a:schemeClr val="accent1"/>
+          </a:fillRef>
+          <a:effectRef idx="0">
+            <a:schemeClr val="accent1"/>
+          </a:effectRef>
+          <a:fontRef idx="minor">
+            <a:schemeClr val="lt1"/>
+          </a:fontRef>
+        </p:style>
+        <p:txBody>
+          <a:bodyPr rtlCol="0" anchor="ctr"/>
+          <a:lstStyle/>
+          <a:p>
+            <a:pPr algn="ctr"/>
+            <a:r>
+              <a:rPr lang="en-PH" sz="4400" dirty="0">
+                <a:solidFill>
+                  <a:schemeClr val="bg1"/>
+                </a:solidFill>
+                <a:latin typeface="Celebes" pitchFamily="50" charset="0"/>
+              </a:rPr>
+              <a:t>Letter B</a:t>
+            </a:r>
+            <a:endParaRPr lang="en-PH" sz="4400" dirty="0">
+              <a:solidFill>
+                <a:schemeClr val="bg1"/>
+              </a:solidFill>
+              <a:latin typeface="Celebes" pitchFamily="50" charset="0"/>
+            </a:endParaRPr>
+          </a:p>
+        </p:txBody>
+      </p:sp>
+      <p:sp>
+        <p:nvSpPr>
+          <p:cNvPr id="16" name="Rounded Rectangle 15"/>
+          <p:cNvSpPr/>
+          <p:nvPr/>
+        </p:nvSpPr>
+        <p:spPr>
+          <a:xfrm>
+            <a:off x="5576981" y="13412787"/>
+            <a:ext cx="4457824" cy="975792"/>
+          </a:xfrm>
+          <a:prstGeom prst="roundRect">
+            <a:avLst/>
+          </a:prstGeom>
+          <a:solidFill>
+            <a:srgbClr val="6FCF40"/>
+          </a:solidFill>
+          <a:ln>
+            <a:noFill/>
+          </a:ln>
+        </p:spPr>
+        <p:style>
+          <a:lnRef idx="2">
+            <a:schemeClr val="accent1">
+              <a:shade val="50000"/>
+            </a:schemeClr>
+          </a:lnRef>
+          <a:fillRef idx="1">
+            <a:schemeClr val="accent1"/>
+          </a:fillRef>
+          <a:effectRef idx="0">
+            <a:schemeClr val="accent1"/>
+          </a:effectRef>
+          <a:fontRef idx="minor">
+            <a:schemeClr val="lt1"/>
+          </a:fontRef>
+        </p:style>
+        <p:txBody>
+          <a:bodyPr rtlCol="0" anchor="ctr"/>
+          <a:lstStyle/>
+          <a:p>
+            <a:pPr algn="ctr"/>
+            <a:r>
+              <a:rPr lang="en-PH" sz="4400" dirty="0">
+                <a:solidFill>
+                  <a:schemeClr val="bg1"/>
+                </a:solidFill>
+                <a:latin typeface="Celebes" pitchFamily="50" charset="0"/>
+              </a:rPr>
+              <a:t>Letter C</a:t>
+            </a:r>
+            <a:endParaRPr lang="en-PH" sz="4400" dirty="0">
+              <a:solidFill>
+                <a:schemeClr val="bg1"/>
+              </a:solidFill>
+              <a:latin typeface="Celebes" pitchFamily="50" charset="0"/>
+            </a:endParaRPr>
+          </a:p>
+        </p:txBody>
+      </p:sp>
+      <p:sp>
+        <p:nvSpPr>
+          <p:cNvPr id="17" name="Rounded Rectangle 16"/>
+          <p:cNvSpPr/>
+          <p:nvPr/>
+        </p:nvSpPr>
+        <p:spPr>
+          <a:xfrm>
+            <a:off x="5559706" y="15317787"/>
+            <a:ext cx="4457824" cy="975792"/>
+          </a:xfrm>
+          <a:prstGeom prst="roundRect">
+            <a:avLst/>
+          </a:prstGeom>
+          <a:solidFill>
+            <a:srgbClr val="6FCF40"/>
+          </a:solidFill>
+          <a:ln>
+            <a:noFill/>
+          </a:ln>
+        </p:spPr>
+        <p:style>
+          <a:lnRef idx="2">
+            <a:schemeClr val="accent1">
+              <a:shade val="50000"/>
+            </a:schemeClr>
+          </a:lnRef>
+          <a:fillRef idx="1">
+            <a:schemeClr val="accent1"/>
+          </a:fillRef>
+          <a:effectRef idx="0">
+            <a:schemeClr val="accent1"/>
+          </a:effectRef>
+          <a:fontRef idx="minor">
+            <a:schemeClr val="lt1"/>
+          </a:fontRef>
+        </p:style>
+        <p:txBody>
+          <a:bodyPr rtlCol="0" anchor="ctr"/>
+          <a:lstStyle/>
+          <a:p>
+            <a:pPr algn="ctr"/>
+            <a:r>
+              <a:rPr lang="en-PH" sz="4400" dirty="0">
+                <a:solidFill>
+                  <a:schemeClr val="bg1"/>
+                </a:solidFill>
+                <a:latin typeface="Celebes" pitchFamily="50" charset="0"/>
+              </a:rPr>
+              <a:t>Letter D</a:t>
+            </a:r>
+            <a:endParaRPr lang="en-PH" sz="4400" dirty="0">
+              <a:solidFill>
+                <a:schemeClr val="bg1"/>
+              </a:solidFill>
+              <a:latin typeface="Celebes" pitchFamily="50" charset="0"/>
+            </a:endParaRPr>
+          </a:p>
+        </p:txBody>
+      </p:sp>
+    </p:spTree>
+    <p:extLst>
+      <p:ext uri="{BB962C8B-B14F-4D97-AF65-F5344CB8AC3E}">
+        <p14:creationId xmlns:p14="http://schemas.microsoft.com/office/powerpoint/2010/main" val="1686073710"/>
+      </p:ext>
+    </p:extLst>
+  </p:cSld>
+  <p:clrMapOvr>
+    <a:masterClrMapping/>
+  </p:clrMapOvr>
+  <p:timing>
+    <p:tnLst>
+      <p:par>
+        <p:cTn id="1" dur="indefinite" restart="never" nodeType="tmRoot"/>
+      </p:par>
+    </p:tnLst>
+  </p:timing>
+</p:sld>
+</file>
+
+<file path=ppt/slides/slide7.xml><?xml version="1.0" encoding="utf-8"?>
+<p:sld xmlns:a="http://schemas.openxmlformats.org/drawingml/2006/main" xmlns:r="http://schemas.openxmlformats.org/officeDocument/2006/relationships" xmlns:p="http://schemas.openxmlformats.org/presentationml/2006/main">
+  <p:cSld>
+    <p:spTree>
+      <p:nvGrpSpPr>
+        <p:cNvPr id="1" name=""/>
+        <p:cNvGrpSpPr/>
+        <p:nvPr/>
+      </p:nvGrpSpPr>
+      <p:grpSpPr>
+        <a:xfrm>
+          <a:off x="0" y="0"/>
+          <a:ext cx="0" cy="0"/>
+          <a:chOff x="0" y="0"/>
+          <a:chExt cx="0" cy="0"/>
+        </a:xfrm>
+      </p:grpSpPr>
+      <p:grpSp>
+        <p:nvGrpSpPr>
+          <p:cNvPr id="8" name="Group 7"/>
+          <p:cNvGrpSpPr/>
+          <p:nvPr/>
+        </p:nvGrpSpPr>
+        <p:grpSpPr>
+          <a:xfrm>
+            <a:off x="-36515" y="0"/>
+            <a:ext cx="10326690" cy="915987"/>
+            <a:chOff x="-36515" y="0"/>
+            <a:chExt cx="10326690" cy="915987"/>
+          </a:xfrm>
+        </p:grpSpPr>
+        <p:sp>
+          <p:nvSpPr>
+            <p:cNvPr id="9" name="Rectangle 8"/>
+            <p:cNvSpPr/>
+            <p:nvPr/>
+          </p:nvSpPr>
+          <p:spPr>
+            <a:xfrm>
+              <a:off x="-36515" y="0"/>
+              <a:ext cx="10326690" cy="915987"/>
+            </a:xfrm>
+            <a:prstGeom prst="rect">
+              <a:avLst/>
+            </a:prstGeom>
+            <a:solidFill>
+              <a:srgbClr val="21A316"/>
+            </a:solidFill>
+            <a:ln>
+              <a:noFill/>
+            </a:ln>
+          </p:spPr>
+          <p:style>
+            <a:lnRef idx="2">
+              <a:schemeClr val="accent1">
+                <a:shade val="50000"/>
+              </a:schemeClr>
+            </a:lnRef>
+            <a:fillRef idx="1">
+              <a:schemeClr val="accent1"/>
+            </a:fillRef>
+            <a:effectRef idx="0">
+              <a:schemeClr val="accent1"/>
+            </a:effectRef>
+            <a:fontRef idx="minor">
+              <a:schemeClr val="lt1"/>
+            </a:fontRef>
+          </p:style>
+          <p:txBody>
+            <a:bodyPr rtlCol="0" anchor="ctr"/>
+            <a:lstStyle/>
+            <a:p>
+              <a:pPr algn="ctr"/>
+              <a:endParaRPr lang="en-PH"/>
+            </a:p>
+          </p:txBody>
+        </p:sp>
+        <p:sp>
+          <p:nvSpPr>
+            <p:cNvPr id="10" name="TextBox 9"/>
+            <p:cNvSpPr txBox="1"/>
+            <p:nvPr/>
+          </p:nvSpPr>
+          <p:spPr>
+            <a:xfrm>
+              <a:off x="1258887" y="153987"/>
+              <a:ext cx="6781800" cy="646331"/>
+            </a:xfrm>
+            <a:prstGeom prst="rect">
+              <a:avLst/>
+            </a:prstGeom>
+            <a:noFill/>
+          </p:spPr>
+          <p:txBody>
+            <a:bodyPr wrap="square" rtlCol="0">
+              <a:spAutoFit/>
+            </a:bodyPr>
+            <a:lstStyle/>
+            <a:p>
+              <a:r>
+                <a:rPr lang="en-PH" sz="3600" dirty="0" smtClean="0">
+                  <a:solidFill>
+                    <a:schemeClr val="bg1"/>
+                  </a:solidFill>
+                  <a:latin typeface="Feather Bold" pitchFamily="82" charset="0"/>
+                </a:rPr>
+                <a:t>HANDSY</a:t>
+              </a:r>
+              <a:endParaRPr lang="en-PH" sz="3600" dirty="0">
+                <a:solidFill>
+                  <a:schemeClr val="bg1"/>
+                </a:solidFill>
+                <a:latin typeface="Feather Bold" pitchFamily="82" charset="0"/>
+              </a:endParaRPr>
+            </a:p>
+          </p:txBody>
+        </p:sp>
+        <p:pic>
+          <p:nvPicPr>
+            <p:cNvPr id="11" name="Picture 2" descr="F:\Installers\Miscellaneous Resources\mascot_official.png"/>
+            <p:cNvPicPr>
+              <a:picLocks noChangeAspect="1" noChangeArrowheads="1"/>
+            </p:cNvPicPr>
+            <p:nvPr/>
+          </p:nvPicPr>
+          <p:blipFill rotWithShape="1">
+            <a:blip r:embed="rId2" cstate="print">
+              <a:extLst>
+                <a:ext uri="{28A0092B-C50C-407E-A947-70E740481C1C}">
+                  <a14:useLocalDpi xmlns:a14="http://schemas.microsoft.com/office/drawing/2010/main" val="0"/>
+                </a:ext>
+              </a:extLst>
+            </a:blip>
+            <a:srcRect l="16482" t="11469" r="15709" b="15037"/>
+            <a:stretch/>
+          </p:blipFill>
+          <p:spPr bwMode="auto">
+            <a:xfrm>
+              <a:off x="456858" y="46717"/>
+              <a:ext cx="802029" cy="869270"/>
+            </a:xfrm>
+            <a:prstGeom prst="rect">
+              <a:avLst/>
+            </a:prstGeom>
+            <a:noFill/>
+            <a:extLst>
+              <a:ext uri="{909E8E84-426E-40DD-AFC4-6F175D3DCCD1}">
+                <a14:hiddenFill xmlns:a14="http://schemas.microsoft.com/office/drawing/2010/main">
+                  <a:solidFill>
+                    <a:srgbClr val="FFFFFF"/>
+                  </a:solidFill>
+                </a14:hiddenFill>
+              </a:ext>
+            </a:extLst>
+          </p:spPr>
+        </p:pic>
+      </p:grpSp>
+      <p:sp>
+        <p:nvSpPr>
+          <p:cNvPr id="32" name="Rounded Rectangle 31"/>
+          <p:cNvSpPr/>
+          <p:nvPr/>
+        </p:nvSpPr>
+        <p:spPr>
+          <a:xfrm>
+            <a:off x="206063" y="1640292"/>
+            <a:ext cx="9878048" cy="11125976"/>
+          </a:xfrm>
+          <a:prstGeom prst="roundRect">
+            <a:avLst>
+              <a:gd name="adj" fmla="val 9952"/>
+            </a:avLst>
+          </a:prstGeom>
+          <a:solidFill>
+            <a:srgbClr val="9FDF80"/>
+          </a:solidFill>
+          <a:ln>
+            <a:solidFill>
+              <a:srgbClr val="6FCF40"/>
+            </a:solidFill>
+          </a:ln>
+        </p:spPr>
+        <p:style>
+          <a:lnRef idx="2">
+            <a:schemeClr val="accent1">
+              <a:shade val="50000"/>
+            </a:schemeClr>
+          </a:lnRef>
+          <a:fillRef idx="1">
+            <a:schemeClr val="accent1"/>
+          </a:fillRef>
+          <a:effectRef idx="0">
+            <a:schemeClr val="accent1"/>
+          </a:effectRef>
+          <a:fontRef idx="minor">
+            <a:schemeClr val="lt1"/>
+          </a:fontRef>
+        </p:style>
+        <p:txBody>
+          <a:bodyPr rtlCol="0" anchor="ctr"/>
+          <a:lstStyle/>
+          <a:p>
+            <a:pPr algn="ctr"/>
+            <a:endParaRPr lang="en-PH"/>
+          </a:p>
+        </p:txBody>
+      </p:sp>
+      <p:sp>
+        <p:nvSpPr>
+          <p:cNvPr id="36" name="TextBox 35"/>
+          <p:cNvSpPr txBox="1"/>
+          <p:nvPr/>
+        </p:nvSpPr>
+        <p:spPr>
+          <a:xfrm>
+            <a:off x="649287" y="1869856"/>
+            <a:ext cx="6781800" cy="646331"/>
+          </a:xfrm>
+          <a:prstGeom prst="rect">
+            <a:avLst/>
+          </a:prstGeom>
+          <a:noFill/>
+          <a:ln>
+            <a:noFill/>
+          </a:ln>
+        </p:spPr>
+        <p:txBody>
+          <a:bodyPr wrap="square" rtlCol="0">
+            <a:spAutoFit/>
+          </a:bodyPr>
+          <a:lstStyle/>
+          <a:p>
+            <a:r>
+              <a:rPr lang="en-PH" sz="3600" dirty="0" smtClean="0">
+                <a:ln w="3175">
+                  <a:noFill/>
+                </a:ln>
+                <a:solidFill>
+                  <a:schemeClr val="bg1"/>
+                </a:solidFill>
+                <a:latin typeface="Feather Bold" pitchFamily="82" charset="0"/>
+              </a:rPr>
+              <a:t>IDENTIFY THE HAND SIGNAL</a:t>
+            </a:r>
+            <a:endParaRPr lang="en-PH" sz="3600" dirty="0">
+              <a:ln w="3175">
+                <a:noFill/>
+              </a:ln>
+              <a:solidFill>
+                <a:schemeClr val="bg1"/>
+              </a:solidFill>
+              <a:latin typeface="Feather Bold" pitchFamily="82" charset="0"/>
+            </a:endParaRPr>
+          </a:p>
+        </p:txBody>
+      </p:sp>
+      <p:sp>
+        <p:nvSpPr>
+          <p:cNvPr id="42" name="Rounded Rectangle 41"/>
+          <p:cNvSpPr/>
+          <p:nvPr/>
+        </p:nvSpPr>
+        <p:spPr>
+          <a:xfrm>
+            <a:off x="206064" y="12766268"/>
+            <a:ext cx="9878048" cy="3884612"/>
+          </a:xfrm>
+          <a:prstGeom prst="roundRect">
+            <a:avLst>
+              <a:gd name="adj" fmla="val 9952"/>
+            </a:avLst>
+          </a:prstGeom>
+          <a:noFill/>
+          <a:ln>
+            <a:noFill/>
+          </a:ln>
+        </p:spPr>
+        <p:style>
+          <a:lnRef idx="2">
+            <a:schemeClr val="accent1">
+              <a:shade val="50000"/>
+            </a:schemeClr>
+          </a:lnRef>
+          <a:fillRef idx="1">
+            <a:schemeClr val="accent1"/>
+          </a:fillRef>
+          <a:effectRef idx="0">
+            <a:schemeClr val="accent1"/>
+          </a:effectRef>
+          <a:fontRef idx="minor">
+            <a:schemeClr val="lt1"/>
+          </a:fontRef>
+        </p:style>
+        <p:txBody>
+          <a:bodyPr rtlCol="0" anchor="ctr"/>
+          <a:lstStyle/>
+          <a:p>
+            <a:pPr algn="just"/>
+            <a:endParaRPr lang="en-PH" sz="4000" dirty="0">
+              <a:solidFill>
+                <a:sysClr val="windowText" lastClr="000000"/>
+              </a:solidFill>
+              <a:latin typeface="Celebes" pitchFamily="50" charset="0"/>
+            </a:endParaRPr>
+          </a:p>
+        </p:txBody>
+      </p:sp>
+      <p:sp>
+        <p:nvSpPr>
+          <p:cNvPr id="18" name="Rounded Rectangle 17"/>
+          <p:cNvSpPr/>
+          <p:nvPr/>
+        </p:nvSpPr>
+        <p:spPr>
+          <a:xfrm>
+            <a:off x="206062" y="16994187"/>
+            <a:ext cx="9878049" cy="975792"/>
+          </a:xfrm>
+          <a:prstGeom prst="roundRect">
+            <a:avLst/>
+          </a:prstGeom>
+          <a:solidFill>
+            <a:srgbClr val="21A316"/>
+          </a:solidFill>
+          <a:ln>
+            <a:noFill/>
+          </a:ln>
+        </p:spPr>
+        <p:style>
+          <a:lnRef idx="2">
+            <a:schemeClr val="accent1">
+              <a:shade val="50000"/>
+            </a:schemeClr>
+          </a:lnRef>
+          <a:fillRef idx="1">
+            <a:schemeClr val="accent1"/>
+          </a:fillRef>
+          <a:effectRef idx="0">
+            <a:schemeClr val="accent1"/>
+          </a:effectRef>
+          <a:fontRef idx="minor">
+            <a:schemeClr val="lt1"/>
+          </a:fontRef>
+        </p:style>
+        <p:txBody>
+          <a:bodyPr rtlCol="0" anchor="ctr"/>
+          <a:lstStyle/>
+          <a:p>
+            <a:pPr algn="ctr"/>
+            <a:r>
+              <a:rPr lang="en-PH" sz="4400" dirty="0" smtClean="0">
+                <a:solidFill>
+                  <a:schemeClr val="bg1"/>
+                </a:solidFill>
+                <a:latin typeface="Feather Bold" pitchFamily="82" charset="0"/>
+              </a:rPr>
+              <a:t>CHECK</a:t>
+            </a:r>
+            <a:endParaRPr lang="en-PH" sz="4400" dirty="0">
+              <a:solidFill>
+                <a:schemeClr val="bg1"/>
+              </a:solidFill>
+              <a:latin typeface="Feather Bold" pitchFamily="82" charset="0"/>
+            </a:endParaRPr>
+          </a:p>
+        </p:txBody>
+      </p:sp>
+      <p:sp>
+        <p:nvSpPr>
+          <p:cNvPr id="15" name="Rounded Rectangle 14"/>
+          <p:cNvSpPr/>
+          <p:nvPr/>
+        </p:nvSpPr>
+        <p:spPr>
+          <a:xfrm>
+            <a:off x="209892" y="15637395"/>
+            <a:ext cx="9807638" cy="975792"/>
+          </a:xfrm>
+          <a:prstGeom prst="roundRect">
+            <a:avLst/>
+          </a:prstGeom>
+          <a:solidFill>
+            <a:srgbClr val="9FDF80"/>
+          </a:solidFill>
+          <a:ln>
+            <a:noFill/>
+          </a:ln>
+        </p:spPr>
+        <p:style>
+          <a:lnRef idx="2">
+            <a:schemeClr val="accent1">
+              <a:shade val="50000"/>
+            </a:schemeClr>
+          </a:lnRef>
+          <a:fillRef idx="1">
+            <a:schemeClr val="accent1"/>
+          </a:fillRef>
+          <a:effectRef idx="0">
+            <a:schemeClr val="accent1"/>
+          </a:effectRef>
+          <a:fontRef idx="minor">
+            <a:schemeClr val="lt1"/>
+          </a:fontRef>
+        </p:style>
+        <p:txBody>
+          <a:bodyPr rtlCol="0" anchor="ctr"/>
+          <a:lstStyle/>
+          <a:p>
+            <a:r>
+              <a:rPr lang="en-PH" sz="4400" dirty="0" smtClean="0">
+                <a:solidFill>
+                  <a:schemeClr val="bg1"/>
+                </a:solidFill>
+                <a:latin typeface="Celebes" pitchFamily="50" charset="0"/>
+              </a:rPr>
+              <a:t>(input)</a:t>
+            </a:r>
+            <a:endParaRPr lang="en-PH" sz="4400" dirty="0">
+              <a:solidFill>
+                <a:schemeClr val="bg1"/>
+              </a:solidFill>
+              <a:latin typeface="Celebes" pitchFamily="50" charset="0"/>
+            </a:endParaRPr>
+          </a:p>
+        </p:txBody>
+      </p:sp>
+    </p:spTree>
+    <p:extLst>
+      <p:ext uri="{BB962C8B-B14F-4D97-AF65-F5344CB8AC3E}">
+        <p14:creationId xmlns:p14="http://schemas.microsoft.com/office/powerpoint/2010/main" val="212831025"/>
+      </p:ext>
+    </p:extLst>
+  </p:cSld>
+  <p:clrMapOvr>
+    <a:masterClrMapping/>
+  </p:clrMapOvr>
+  <p:timing>
+    <p:tnLst>
+      <p:par>
+        <p:cTn id="1" dur="indefinite" restart="never" nodeType="tmRoot"/>
+      </p:par>
+    </p:tnLst>
+  </p:timing>
+</p:sld>
+</file>
+
+<file path=ppt/slides/slide8.xml><?xml version="1.0" encoding="utf-8"?>
+<p:sld xmlns:a="http://schemas.openxmlformats.org/drawingml/2006/main" xmlns:r="http://schemas.openxmlformats.org/officeDocument/2006/relationships" xmlns:p="http://schemas.openxmlformats.org/presentationml/2006/main">
+  <p:cSld>
+    <p:spTree>
+      <p:nvGrpSpPr>
+        <p:cNvPr id="1" name=""/>
+        <p:cNvGrpSpPr/>
+        <p:nvPr/>
+      </p:nvGrpSpPr>
+      <p:grpSpPr>
+        <a:xfrm>
+          <a:off x="0" y="0"/>
+          <a:ext cx="0" cy="0"/>
+          <a:chOff x="0" y="0"/>
+          <a:chExt cx="0" cy="0"/>
+        </a:xfrm>
+      </p:grpSpPr>
+      <p:grpSp>
+        <p:nvGrpSpPr>
+          <p:cNvPr id="8" name="Group 7"/>
+          <p:cNvGrpSpPr/>
+          <p:nvPr/>
+        </p:nvGrpSpPr>
+        <p:grpSpPr>
+          <a:xfrm>
+            <a:off x="-36515" y="0"/>
+            <a:ext cx="10326690" cy="915987"/>
+            <a:chOff x="-36515" y="0"/>
+            <a:chExt cx="10326690" cy="915987"/>
+          </a:xfrm>
+        </p:grpSpPr>
+        <p:sp>
+          <p:nvSpPr>
+            <p:cNvPr id="9" name="Rectangle 8"/>
+            <p:cNvSpPr/>
+            <p:nvPr/>
+          </p:nvSpPr>
+          <p:spPr>
+            <a:xfrm>
+              <a:off x="-36515" y="0"/>
+              <a:ext cx="10326690" cy="915987"/>
+            </a:xfrm>
+            <a:prstGeom prst="rect">
+              <a:avLst/>
+            </a:prstGeom>
+            <a:solidFill>
+              <a:srgbClr val="21A316"/>
+            </a:solidFill>
+            <a:ln>
+              <a:noFill/>
+            </a:ln>
+          </p:spPr>
+          <p:style>
+            <a:lnRef idx="2">
+              <a:schemeClr val="accent1">
+                <a:shade val="50000"/>
+              </a:schemeClr>
+            </a:lnRef>
+            <a:fillRef idx="1">
+              <a:schemeClr val="accent1"/>
+            </a:fillRef>
+            <a:effectRef idx="0">
+              <a:schemeClr val="accent1"/>
+            </a:effectRef>
+            <a:fontRef idx="minor">
+              <a:schemeClr val="lt1"/>
+            </a:fontRef>
+          </p:style>
+          <p:txBody>
+            <a:bodyPr rtlCol="0" anchor="ctr"/>
+            <a:lstStyle/>
+            <a:p>
+              <a:pPr algn="ctr"/>
+              <a:endParaRPr lang="en-PH"/>
+            </a:p>
+          </p:txBody>
+        </p:sp>
+        <p:sp>
+          <p:nvSpPr>
+            <p:cNvPr id="10" name="TextBox 9"/>
+            <p:cNvSpPr txBox="1"/>
+            <p:nvPr/>
+          </p:nvSpPr>
+          <p:spPr>
+            <a:xfrm>
+              <a:off x="1258887" y="153987"/>
+              <a:ext cx="6781800" cy="646331"/>
+            </a:xfrm>
+            <a:prstGeom prst="rect">
+              <a:avLst/>
+            </a:prstGeom>
+            <a:noFill/>
+          </p:spPr>
+          <p:txBody>
+            <a:bodyPr wrap="square" rtlCol="0">
+              <a:spAutoFit/>
+            </a:bodyPr>
+            <a:lstStyle/>
+            <a:p>
+              <a:r>
+                <a:rPr lang="en-PH" sz="3600" dirty="0" smtClean="0">
+                  <a:solidFill>
+                    <a:schemeClr val="bg1"/>
+                  </a:solidFill>
+                  <a:latin typeface="Feather Bold" pitchFamily="82" charset="0"/>
+                </a:rPr>
+                <a:t>HANDSY</a:t>
+              </a:r>
+              <a:endParaRPr lang="en-PH" sz="3600" dirty="0">
+                <a:solidFill>
+                  <a:schemeClr val="bg1"/>
+                </a:solidFill>
+                <a:latin typeface="Feather Bold" pitchFamily="82" charset="0"/>
+              </a:endParaRPr>
+            </a:p>
+          </p:txBody>
+        </p:sp>
+        <p:pic>
+          <p:nvPicPr>
+            <p:cNvPr id="11" name="Picture 2" descr="F:\Installers\Miscellaneous Resources\mascot_official.png"/>
+            <p:cNvPicPr>
+              <a:picLocks noChangeAspect="1" noChangeArrowheads="1"/>
+            </p:cNvPicPr>
+            <p:nvPr/>
+          </p:nvPicPr>
+          <p:blipFill rotWithShape="1">
+            <a:blip r:embed="rId2" cstate="print">
+              <a:extLst>
+                <a:ext uri="{28A0092B-C50C-407E-A947-70E740481C1C}">
+                  <a14:useLocalDpi xmlns:a14="http://schemas.microsoft.com/office/drawing/2010/main" val="0"/>
+                </a:ext>
+              </a:extLst>
+            </a:blip>
+            <a:srcRect l="16482" t="11469" r="15709" b="15037"/>
+            <a:stretch/>
+          </p:blipFill>
+          <p:spPr bwMode="auto">
+            <a:xfrm>
+              <a:off x="456858" y="46717"/>
+              <a:ext cx="802029" cy="869270"/>
+            </a:xfrm>
+            <a:prstGeom prst="rect">
+              <a:avLst/>
+            </a:prstGeom>
+            <a:noFill/>
+            <a:extLst>
+              <a:ext uri="{909E8E84-426E-40DD-AFC4-6F175D3DCCD1}">
+                <a14:hiddenFill xmlns:a14="http://schemas.microsoft.com/office/drawing/2010/main">
+                  <a:solidFill>
+                    <a:srgbClr val="FFFFFF"/>
+                  </a:solidFill>
+                </a14:hiddenFill>
+              </a:ext>
+            </a:extLst>
+          </p:spPr>
+        </p:pic>
+      </p:grpSp>
+      <p:sp>
+        <p:nvSpPr>
+          <p:cNvPr id="32" name="Rounded Rectangle 31"/>
+          <p:cNvSpPr/>
+          <p:nvPr/>
+        </p:nvSpPr>
+        <p:spPr>
+          <a:xfrm>
+            <a:off x="206063" y="1640292"/>
+            <a:ext cx="9878048" cy="11125976"/>
+          </a:xfrm>
+          <a:prstGeom prst="roundRect">
+            <a:avLst>
+              <a:gd name="adj" fmla="val 9952"/>
+            </a:avLst>
+          </a:prstGeom>
+          <a:blipFill dpi="0" rotWithShape="1">
+            <a:blip r:embed="rId3">
+              <a:extLst>
+                <a:ext uri="{BEBA8EAE-BF5A-486C-A8C5-ECC9F3942E4B}">
+                  <a14:imgProps xmlns:a14="http://schemas.microsoft.com/office/drawing/2010/main">
+                    <a14:imgLayer r:embed="rId4">
+                      <a14:imgEffect>
+                        <a14:sharpenSoften amount="-50000"/>
+                      </a14:imgEffect>
+                      <a14:imgEffect>
+                        <a14:saturation sat="66000"/>
+                      </a14:imgEffect>
+                    </a14:imgLayer>
+                  </a14:imgProps>
+                </a:ext>
+                <a:ext uri="{28A0092B-C50C-407E-A947-70E740481C1C}">
+                  <a14:useLocalDpi xmlns:a14="http://schemas.microsoft.com/office/drawing/2010/main" val="0"/>
+                </a:ext>
+              </a:extLst>
+            </a:blip>
+            <a:srcRect/>
+            <a:stretch>
+              <a:fillRect/>
+            </a:stretch>
+          </a:blipFill>
+          <a:ln>
+            <a:solidFill>
+              <a:srgbClr val="6FCF40"/>
+            </a:solidFill>
+          </a:ln>
+        </p:spPr>
+        <p:style>
+          <a:lnRef idx="2">
+            <a:schemeClr val="accent1">
+              <a:shade val="50000"/>
+            </a:schemeClr>
+          </a:lnRef>
+          <a:fillRef idx="1">
+            <a:schemeClr val="accent1"/>
+          </a:fillRef>
+          <a:effectRef idx="0">
+            <a:schemeClr val="accent1"/>
+          </a:effectRef>
+          <a:fontRef idx="minor">
+            <a:schemeClr val="lt1"/>
+          </a:fontRef>
+        </p:style>
+        <p:txBody>
+          <a:bodyPr rtlCol="0" anchor="ctr"/>
+          <a:lstStyle/>
+          <a:p>
+            <a:pPr algn="ctr"/>
+            <a:endParaRPr lang="en-PH"/>
+          </a:p>
+        </p:txBody>
+      </p:sp>
+      <p:sp>
+        <p:nvSpPr>
+          <p:cNvPr id="42" name="Rounded Rectangle 41"/>
+          <p:cNvSpPr/>
+          <p:nvPr/>
+        </p:nvSpPr>
+        <p:spPr>
+          <a:xfrm>
+            <a:off x="206064" y="12766268"/>
+            <a:ext cx="9878048" cy="3884612"/>
+          </a:xfrm>
+          <a:prstGeom prst="roundRect">
+            <a:avLst>
+              <a:gd name="adj" fmla="val 9952"/>
+            </a:avLst>
+          </a:prstGeom>
+          <a:noFill/>
+          <a:ln>
+            <a:noFill/>
+          </a:ln>
+        </p:spPr>
+        <p:style>
+          <a:lnRef idx="2">
+            <a:schemeClr val="accent1">
+              <a:shade val="50000"/>
+            </a:schemeClr>
+          </a:lnRef>
+          <a:fillRef idx="1">
+            <a:schemeClr val="accent1"/>
+          </a:fillRef>
+          <a:effectRef idx="0">
+            <a:schemeClr val="accent1"/>
+          </a:effectRef>
+          <a:fontRef idx="minor">
+            <a:schemeClr val="lt1"/>
+          </a:fontRef>
+        </p:style>
+        <p:txBody>
+          <a:bodyPr rtlCol="0" anchor="ctr"/>
+          <a:lstStyle/>
+          <a:p>
+            <a:pPr algn="just"/>
+            <a:endParaRPr lang="en-PH" sz="4000" dirty="0">
+              <a:solidFill>
+                <a:sysClr val="windowText" lastClr="000000"/>
+              </a:solidFill>
+              <a:latin typeface="Celebes" pitchFamily="50" charset="0"/>
+            </a:endParaRPr>
+          </a:p>
+        </p:txBody>
+      </p:sp>
+      <p:sp>
+        <p:nvSpPr>
+          <p:cNvPr id="18" name="Rounded Rectangle 17"/>
+          <p:cNvSpPr/>
+          <p:nvPr/>
+        </p:nvSpPr>
+        <p:spPr>
+          <a:xfrm>
+            <a:off x="206062" y="16994187"/>
+            <a:ext cx="9878049" cy="975792"/>
+          </a:xfrm>
+          <a:prstGeom prst="roundRect">
+            <a:avLst/>
+          </a:prstGeom>
+          <a:solidFill>
+            <a:srgbClr val="21A316"/>
+          </a:solidFill>
+          <a:ln>
+            <a:noFill/>
+          </a:ln>
+        </p:spPr>
+        <p:style>
+          <a:lnRef idx="2">
+            <a:schemeClr val="accent1">
+              <a:shade val="50000"/>
+            </a:schemeClr>
+          </a:lnRef>
+          <a:fillRef idx="1">
+            <a:schemeClr val="accent1"/>
+          </a:fillRef>
+          <a:effectRef idx="0">
+            <a:schemeClr val="accent1"/>
+          </a:effectRef>
+          <a:fontRef idx="minor">
+            <a:schemeClr val="lt1"/>
+          </a:fontRef>
+        </p:style>
+        <p:txBody>
+          <a:bodyPr rtlCol="0" anchor="ctr"/>
+          <a:lstStyle/>
+          <a:p>
+            <a:pPr algn="ctr"/>
+            <a:r>
+              <a:rPr lang="en-PH" sz="4400" dirty="0" smtClean="0">
+                <a:solidFill>
+                  <a:schemeClr val="bg1"/>
+                </a:solidFill>
+                <a:latin typeface="Feather Bold" pitchFamily="82" charset="0"/>
+              </a:rPr>
+              <a:t>CHECK</a:t>
+            </a:r>
+            <a:endParaRPr lang="en-PH" sz="4400" dirty="0">
+              <a:solidFill>
+                <a:schemeClr val="bg1"/>
+              </a:solidFill>
+              <a:latin typeface="Feather Bold" pitchFamily="82" charset="0"/>
+            </a:endParaRPr>
+          </a:p>
+        </p:txBody>
+      </p:sp>
+      <p:sp>
+        <p:nvSpPr>
+          <p:cNvPr id="12" name="TextBox 11"/>
+          <p:cNvSpPr txBox="1"/>
+          <p:nvPr/>
+        </p:nvSpPr>
+        <p:spPr>
+          <a:xfrm>
+            <a:off x="206061" y="16004549"/>
+            <a:ext cx="9878050" cy="646331"/>
+          </a:xfrm>
+          <a:prstGeom prst="rect">
+            <a:avLst/>
+          </a:prstGeom>
+          <a:noFill/>
+          <a:ln>
+            <a:noFill/>
+          </a:ln>
+        </p:spPr>
+        <p:txBody>
+          <a:bodyPr wrap="square" rtlCol="0">
+            <a:spAutoFit/>
+          </a:bodyPr>
+          <a:lstStyle/>
+          <a:p>
+            <a:pPr algn="just"/>
+            <a:r>
+              <a:rPr lang="en-PH" sz="3600" dirty="0" smtClean="0">
+                <a:ln w="3175">
+                  <a:noFill/>
+                </a:ln>
+                <a:latin typeface="Feather Bold" pitchFamily="82" charset="0"/>
+              </a:rPr>
+              <a:t>Emulate the hand signal on your camera</a:t>
+            </a:r>
+            <a:endParaRPr lang="en-PH" sz="3600" dirty="0">
+              <a:ln w="3175">
+                <a:noFill/>
+              </a:ln>
+              <a:latin typeface="Feather Bold" pitchFamily="82" charset="0"/>
+            </a:endParaRPr>
+          </a:p>
+        </p:txBody>
+      </p:sp>
+      <p:sp>
+        <p:nvSpPr>
+          <p:cNvPr id="13" name="TextBox 12"/>
+          <p:cNvSpPr txBox="1"/>
+          <p:nvPr/>
+        </p:nvSpPr>
+        <p:spPr>
+          <a:xfrm>
+            <a:off x="187805" y="13336587"/>
+            <a:ext cx="9878050" cy="2215991"/>
+          </a:xfrm>
+          <a:prstGeom prst="rect">
+            <a:avLst/>
+          </a:prstGeom>
+          <a:noFill/>
+          <a:ln>
+            <a:noFill/>
+          </a:ln>
+        </p:spPr>
+        <p:txBody>
+          <a:bodyPr wrap="square" rtlCol="0">
+            <a:spAutoFit/>
+          </a:bodyPr>
+          <a:lstStyle/>
+          <a:p>
+            <a:pPr algn="ctr"/>
+            <a:r>
+              <a:rPr lang="en-PH" sz="13800" dirty="0" smtClean="0">
+                <a:ln w="3175">
+                  <a:noFill/>
+                </a:ln>
+                <a:latin typeface="Feather Bold" pitchFamily="82" charset="0"/>
+              </a:rPr>
+              <a:t>A</a:t>
+            </a:r>
+            <a:endParaRPr lang="en-PH" sz="13800" dirty="0">
+              <a:ln w="3175">
+                <a:noFill/>
+              </a:ln>
+              <a:latin typeface="Feather Bold" pitchFamily="82" charset="0"/>
+            </a:endParaRPr>
+          </a:p>
+        </p:txBody>
+      </p:sp>
+    </p:spTree>
+    <p:extLst>
+      <p:ext uri="{BB962C8B-B14F-4D97-AF65-F5344CB8AC3E}">
+        <p14:creationId xmlns:p14="http://schemas.microsoft.com/office/powerpoint/2010/main" val="3137369382"/>
+      </p:ext>
+    </p:extLst>
+  </p:cSld>
+  <p:clrMapOvr>
+    <a:masterClrMapping/>
+  </p:clrMapOvr>
+  <p:timing>
+    <p:tnLst>
+      <p:par>
+        <p:cTn id="1" dur="indefinite" restart="never" nodeType="tmRoot"/>
+      </p:par>
+    </p:tnLst>
+  </p:timing>
+</p:sld>
+</file>
+
+<file path=ppt/slides/slide9.xml><?xml version="1.0" encoding="utf-8"?>
+<p:sld xmlns:a="http://schemas.openxmlformats.org/drawingml/2006/main" xmlns:r="http://schemas.openxmlformats.org/officeDocument/2006/relationships" xmlns:p="http://schemas.openxmlformats.org/presentationml/2006/main">
+  <p:cSld>
+    <p:spTree>
+      <p:nvGrpSpPr>
+        <p:cNvPr id="1" name=""/>
+        <p:cNvGrpSpPr/>
+        <p:nvPr/>
+      </p:nvGrpSpPr>
+      <p:grpSpPr>
+        <a:xfrm>
+          <a:off x="0" y="0"/>
+          <a:ext cx="0" cy="0"/>
+          <a:chOff x="0" y="0"/>
+          <a:chExt cx="0" cy="0"/>
+        </a:xfrm>
+      </p:grpSpPr>
       <p:grpSp>
         <p:nvGrpSpPr>
           <p:cNvPr id="2" name="Group 1"/>
@@ -3986,7 +7141,7 @@
           <p:spPr>
             <a:xfrm>
               <a:off x="765173" y="3202523"/>
-              <a:ext cx="8723313" cy="6247864"/>
+              <a:ext cx="8723313" cy="3170099"/>
             </a:xfrm>
             <a:prstGeom prst="rect">
               <a:avLst/>
@@ -4003,7 +7158,19 @@
                 <a:rPr lang="en-PH" sz="4000" dirty="0" smtClean="0">
                   <a:latin typeface="Celebes" pitchFamily="50" charset="0"/>
                 </a:rPr>
-                <a:t>Handsy Sign Language Tutorial is a mobile application with the purpose of providing an accessible platform for learning the Filipino Sign Language for anyone, but most especially for those who are auditory and hearing impaired.</a:t>
+                <a:t>Congratulations  </a:t>
+              </a:r>
+              <a:r>
+                <a:rPr lang="en-PH" sz="4000" b="1" dirty="0" smtClean="0">
+                  <a:latin typeface="Celebes" pitchFamily="50" charset="0"/>
+                </a:rPr>
+                <a:t>BERLIN</a:t>
+              </a:r>
+              <a:r>
+                <a:rPr lang="en-PH" sz="4000" dirty="0" smtClean="0">
+                  <a:latin typeface="Celebes" pitchFamily="50" charset="0"/>
+                </a:rPr>
+                <a:t>.</a:t>
               </a:r>
             </a:p>
             <a:p>
@@ -4016,7 +7183,7 @@
                 <a:rPr lang="en-PH" sz="4000" dirty="0" smtClean="0">
                   <a:latin typeface="Celebes" pitchFamily="50" charset="0"/>
                 </a:rPr>
-                <a:t>We hope you enjoy  using this application</a:t>
+                <a:t>Try other alphabets to further hone your use of the Filipino Sign Language and be a star</a:t>
               </a:r>
               <a:endParaRPr lang="en-PH" sz="4000" dirty="0">
                 <a:latin typeface="Celebes" pitchFamily="50" charset="0"/>
@@ -4067,13 +7234,13 @@
             <a:p>
               <a:pPr algn="ctr"/>
               <a:r>
-                <a:rPr lang="en-PH" sz="4400" dirty="0" smtClean="0">
+                <a:rPr lang="en-PH" sz="4400" smtClean="0">
                   <a:solidFill>
                     <a:schemeClr val="bg1"/>
                   </a:solidFill>
                   <a:latin typeface="Feather Bold" pitchFamily="82" charset="0"/>
                 </a:rPr>
-                <a:t>Start Your Journey</a:t>
+                <a:t>CONTINUE</a:t>
               </a:r>
               <a:endParaRPr lang="en-PH" sz="4400" dirty="0">
                 <a:solidFill>
@@ -4108,7 +7275,7 @@
         </p:blipFill>
         <p:spPr bwMode="auto">
           <a:xfrm>
-            <a:off x="421085" y="1297783"/>
+            <a:off x="421085" y="763587"/>
             <a:ext cx="9448004" cy="9448004"/>
           </a:xfrm>
           <a:prstGeom prst="rect">
@@ -4126,10 +7293,150 @@
           </a:extLst>
         </p:spPr>
       </p:pic>
+      <p:grpSp>
+        <p:nvGrpSpPr>
+          <p:cNvPr id="8" name="Group 7"/>
+          <p:cNvGrpSpPr/>
+          <p:nvPr/>
+        </p:nvGrpSpPr>
+        <p:grpSpPr>
+          <a:xfrm>
+            <a:off x="-36515" y="0"/>
+            <a:ext cx="10326690" cy="915987"/>
+            <a:chOff x="-36515" y="0"/>
+            <a:chExt cx="10326690" cy="915987"/>
+          </a:xfrm>
+        </p:grpSpPr>
+        <p:sp>
+          <p:nvSpPr>
+            <p:cNvPr id="4" name="Rectangle 3"/>
+            <p:cNvSpPr/>
+            <p:nvPr/>
+          </p:nvSpPr>
+          <p:spPr>
+            <a:xfrm>
+              <a:off x="-36515" y="0"/>
+              <a:ext cx="10326690" cy="915987"/>
+            </a:xfrm>
+            <a:prstGeom prst="rect">
+              <a:avLst/>
+            </a:prstGeom>
+            <a:solidFill>
+              <a:srgbClr val="21A316"/>
+            </a:solidFill>
+            <a:ln>
+              <a:noFill/>
+            </a:ln>
+          </p:spPr>
+          <p:style>
+            <a:lnRef idx="2">
+              <a:schemeClr val="accent1">
+                <a:shade val="50000"/>
+              </a:schemeClr>
+            </a:lnRef>
+            <a:fillRef idx="1">
+              <a:schemeClr val="accent1"/>
+            </a:fillRef>
+            <a:effectRef idx="0">
+              <a:schemeClr val="accent1"/>
+            </a:effectRef>
+            <a:fontRef idx="minor">
+              <a:schemeClr val="lt1"/>
+            </a:fontRef>
+          </p:style>
+          <p:txBody>
+            <a:bodyPr rtlCol="0" anchor="ctr"/>
+            <a:lstStyle/>
+            <a:p>
+              <a:pPr algn="ctr"/>
+              <a:endParaRPr lang="en-PH"/>
+            </a:p>
+          </p:txBody>
+        </p:sp>
+        <p:sp>
+          <p:nvSpPr>
+            <p:cNvPr id="5" name="TextBox 4"/>
+            <p:cNvSpPr txBox="1"/>
+            <p:nvPr/>
+          </p:nvSpPr>
+          <p:spPr>
+            <a:xfrm>
+              <a:off x="1258887" y="153987"/>
+              <a:ext cx="6781800" cy="646331"/>
+            </a:xfrm>
+            <a:prstGeom prst="rect">
+              <a:avLst/>
+            </a:prstGeom>
+            <a:noFill/>
+          </p:spPr>
+          <p:txBody>
+            <a:bodyPr wrap="square" rtlCol="0">
+              <a:spAutoFit/>
+            </a:bodyPr>
+            <a:lstStyle/>
+            <a:p>
+              <a:r>
+                <a:rPr lang="en-PH" sz="3600" dirty="0" smtClean="0">
+                  <a:solidFill>
+                    <a:schemeClr val="bg1"/>
+                  </a:solidFill>
+                  <a:latin typeface="Feather Bold" pitchFamily="82" charset="0"/>
+                </a:rPr>
+                <a:t>HANDSY</a:t>
+              </a:r>
+              <a:endParaRPr lang="en-PH" sz="3600" dirty="0">
+                <a:solidFill>
+                  <a:schemeClr val="bg1"/>
+                </a:solidFill>
+                <a:latin typeface="Feather Bold" pitchFamily="82" charset="0"/>
+              </a:endParaRPr>
+            </a:p>
+          </p:txBody>
+        </p:sp>
+        <p:pic>
+          <p:nvPicPr>
+            <p:cNvPr id="9" name="Picture 2" descr="F:\Installers\Miscellaneous Resources\mascot_official.png"/>
+            <p:cNvPicPr>
+              <a:picLocks noChangeAspect="1" noChangeArrowheads="1"/>
+            </p:cNvPicPr>
+            <p:nvPr/>
+          </p:nvPicPr>
+          <p:blipFill rotWithShape="1">
+            <a:blip r:embed="rId3" cstate="print">
+              <a:extLst>
+                <a:ext uri="{28A0092B-C50C-407E-A947-70E740481C1C}">
+                  <a14:useLocalDpi xmlns:a14="http://schemas.microsoft.com/office/drawing/2010/main" val="0"/>
+                </a:ext>
+              </a:extLst>
+            </a:blip>
+            <a:srcRect l="16482" t="11469" r="15709" b="15037"/>
+            <a:stretch/>
+          </p:blipFill>
+          <p:spPr bwMode="auto">
+            <a:xfrm>
+              <a:off x="456858" y="46717"/>
+              <a:ext cx="802029" cy="869270"/>
+            </a:xfrm>
+            <a:prstGeom prst="rect">
+              <a:avLst/>
+            </a:prstGeom>
+            <a:noFill/>
+            <a:extLst>
+              <a:ext uri="{909E8E84-426E-40DD-AFC4-6F175D3DCCD1}">
+                <a14:hiddenFill xmlns:a14="http://schemas.microsoft.com/office/drawing/2010/main">
+                  <a:solidFill>
+                    <a:srgbClr val="FFFFFF"/>
+                  </a:solidFill>
+                </a14:hiddenFill>
+              </a:ext>
+            </a:extLst>
+          </p:spPr>
+        </p:pic>
+      </p:grpSp>
     </p:spTree>
     <p:extLst>
       <p:ext uri="{BB962C8B-B14F-4D97-AF65-F5344CB8AC3E}">
-        <p14:creationId xmlns:p14="http://schemas.microsoft.com/office/powerpoint/2010/main" val="3158800173"/>
+        <p14:creationId xmlns:p14="http://schemas.microsoft.com/office/powerpoint/2010/main" val="398933739"/>
       </p:ext>
     </p:extLst>
   </p:cSld>

</xml_diff>